<commit_message>
removing joke that did not age well
</commit_message>
<xml_diff>
--- a/ClassMaterials/OccursBound/12-OccursBound-LexAddr-reverse.pptx
+++ b/ClassMaterials/OccursBound/12-OccursBound-LexAddr-reverse.pptx
@@ -5,10 +5,10 @@
     <p:sldMasterId id="2147483781" r:id="rId1"/>
   </p:sldMasterIdLst>
   <p:notesMasterIdLst>
-    <p:notesMasterId r:id="rId22"/>
+    <p:notesMasterId r:id="rId21"/>
   </p:notesMasterIdLst>
   <p:handoutMasterIdLst>
-    <p:handoutMasterId r:id="rId23"/>
+    <p:handoutMasterId r:id="rId22"/>
   </p:handoutMasterIdLst>
   <p:sldIdLst>
     <p:sldId id="394" r:id="rId2"/>
@@ -30,7 +30,6 @@
     <p:sldId id="392" r:id="rId18"/>
     <p:sldId id="370" r:id="rId19"/>
     <p:sldId id="371" r:id="rId20"/>
-    <p:sldId id="399" r:id="rId21"/>
   </p:sldIdLst>
   <p:sldSz cx="12192000" cy="6858000"/>
   <p:notesSz cx="7315200" cy="9601200"/>
@@ -10116,299 +10115,6 @@
       <p:bldP spid="577539" grpId="0" uiExpand="1" build="p"/>
     </p:bldLst>
   </p:timing>
-</p:sld>
-</file>
-
-<file path=ppt/slides/slide20.xml><?xml version="1.0" encoding="utf-8"?>
-<p:sld xmlns:a="http://schemas.openxmlformats.org/drawingml/2006/main" xmlns:r="http://schemas.openxmlformats.org/officeDocument/2006/relationships" xmlns:p="http://schemas.openxmlformats.org/presentationml/2006/main" show="0">
-  <p:cSld>
-    <p:spTree>
-      <p:nvGrpSpPr>
-        <p:cNvPr id="1" name=""/>
-        <p:cNvGrpSpPr/>
-        <p:nvPr/>
-      </p:nvGrpSpPr>
-      <p:grpSpPr>
-        <a:xfrm>
-          <a:off x="0" y="0"/>
-          <a:ext cx="0" cy="0"/>
-          <a:chOff x="0" y="0"/>
-          <a:chExt cx="0" cy="0"/>
-        </a:xfrm>
-      </p:grpSpPr>
-      <p:sp>
-        <p:nvSpPr>
-          <p:cNvPr id="452610" name="Rectangle 2"/>
-          <p:cNvSpPr>
-            <a:spLocks noGrp="1" noChangeArrowheads="1"/>
-          </p:cNvSpPr>
-          <p:nvPr>
-            <p:ph type="title"/>
-          </p:nvPr>
-        </p:nvSpPr>
-        <p:spPr>
-          <a:xfrm>
-            <a:off x="1981200" y="277813"/>
-            <a:ext cx="8229600" cy="488950"/>
-          </a:xfrm>
-        </p:spPr>
-        <p:txBody>
-          <a:bodyPr/>
-          <a:lstStyle/>
-          <a:p>
-            <a:r>
-              <a:rPr lang="en-US" sz="4000" b="1"/>
-              <a:t>Interlude</a:t>
-            </a:r>
-            <a:endParaRPr lang="en-US" sz="4000"/>
-          </a:p>
-        </p:txBody>
-      </p:sp>
-      <p:sp>
-        <p:nvSpPr>
-          <p:cNvPr id="452611" name="Text Box 3"/>
-          <p:cNvSpPr txBox="1">
-            <a:spLocks noChangeArrowheads="1"/>
-          </p:cNvSpPr>
-          <p:nvPr/>
-        </p:nvSpPr>
-        <p:spPr bwMode="auto">
-          <a:xfrm>
-            <a:off x="1533939" y="522288"/>
-            <a:ext cx="9144000" cy="4724370"/>
-          </a:xfrm>
-          <a:prstGeom prst="rect">
-            <a:avLst/>
-          </a:prstGeom>
-          <a:noFill/>
-          <a:ln w="9525">
-            <a:noFill/>
-            <a:miter lim="800000"/>
-            <a:headEnd/>
-            <a:tailEnd/>
-          </a:ln>
-          <a:effectLst/>
-        </p:spPr>
-        <p:txBody>
-          <a:bodyPr>
-            <a:spAutoFit/>
-          </a:bodyPr>
-          <a:lstStyle/>
-          <a:p>
-            <a:endParaRPr lang="en-US" dirty="0">
-              <a:solidFill>
-                <a:schemeClr val="bg1"/>
-              </a:solidFill>
-            </a:endParaRPr>
-          </a:p>
-          <a:p>
-            <a:r>
-              <a:rPr lang="en-US" dirty="0" err="1">
-                <a:solidFill>
-                  <a:schemeClr val="bg1"/>
-                </a:solidFill>
-              </a:rPr>
-              <a:t>Assaf</a:t>
-            </a:r>
-            <a:r>
-              <a:rPr lang="en-US" dirty="0">
-                <a:solidFill>
-                  <a:schemeClr val="bg1"/>
-                </a:solidFill>
-              </a:rPr>
-              <a:t> </a:t>
-            </a:r>
-            <a:r>
-              <a:rPr lang="en-US" dirty="0" err="1">
-                <a:solidFill>
-                  <a:schemeClr val="bg1"/>
-                </a:solidFill>
-              </a:rPr>
-              <a:t>Razon</a:t>
-            </a:r>
-            <a:r>
-              <a:rPr lang="en-US" dirty="0">
-                <a:solidFill>
-                  <a:schemeClr val="bg1"/>
-                </a:solidFill>
-              </a:rPr>
-              <a:t> wrote:</a:t>
-            </a:r>
-          </a:p>
-          <a:p>
-            <a:r>
-              <a:rPr lang="en-US" sz="2200" dirty="0">
-                <a:solidFill>
-                  <a:schemeClr val="bg1"/>
-                </a:solidFill>
-              </a:rPr>
-              <a:t>&gt; </a:t>
-            </a:r>
-          </a:p>
-          <a:p>
-            <a:r>
-              <a:rPr lang="en-US" sz="2200" dirty="0">
-                <a:solidFill>
-                  <a:schemeClr val="bg1"/>
-                </a:solidFill>
-              </a:rPr>
-              <a:t>&gt; A few of my friends and I attended a wedding. Being from Israel, this </a:t>
-            </a:r>
-          </a:p>
-          <a:p>
-            <a:r>
-              <a:rPr lang="en-US" sz="2200" dirty="0">
-                <a:solidFill>
-                  <a:schemeClr val="bg1"/>
-                </a:solidFill>
-              </a:rPr>
-              <a:t>&gt; is naturally a Jewish wedding, and one of my friends is an ex combat </a:t>
-            </a:r>
-          </a:p>
-          <a:p>
-            <a:r>
-              <a:rPr lang="en-US" sz="2200" dirty="0">
-                <a:solidFill>
-                  <a:schemeClr val="bg1"/>
-                </a:solidFill>
-              </a:rPr>
-              <a:t>&gt; officer in the Army.</a:t>
-            </a:r>
-          </a:p>
-          <a:p>
-            <a:r>
-              <a:rPr lang="en-US" sz="2200" dirty="0">
-                <a:solidFill>
-                  <a:schemeClr val="bg1"/>
-                </a:solidFill>
-              </a:rPr>
-              <a:t>&gt; </a:t>
-            </a:r>
-          </a:p>
-          <a:p>
-            <a:r>
-              <a:rPr lang="en-US" sz="2200" dirty="0">
-                <a:solidFill>
-                  <a:schemeClr val="bg1"/>
-                </a:solidFill>
-              </a:rPr>
-              <a:t>&gt; So we were talking about throwing the bouquet, and I said (being the </a:t>
-            </a:r>
-          </a:p>
-          <a:p>
-            <a:r>
-              <a:rPr lang="en-US" sz="2200" dirty="0">
-                <a:solidFill>
-                  <a:schemeClr val="bg1"/>
-                </a:solidFill>
-              </a:rPr>
-              <a:t>&gt; insistent wedding-basher) that if one were thrown at me, I'd dodge it. </a:t>
-            </a:r>
-          </a:p>
-          <a:p>
-            <a:r>
-              <a:rPr lang="en-US" sz="2200" dirty="0">
-                <a:solidFill>
-                  <a:schemeClr val="bg1"/>
-                </a:solidFill>
-              </a:rPr>
-              <a:t>&gt; So my friend said: "I'll just throw it at you like the Palestinians </a:t>
-            </a:r>
-          </a:p>
-          <a:p>
-            <a:r>
-              <a:rPr lang="en-US" sz="2200" dirty="0">
-                <a:solidFill>
-                  <a:schemeClr val="bg1"/>
-                </a:solidFill>
-              </a:rPr>
-              <a:t>&gt; throw rocks and bombs at us", </a:t>
-            </a:r>
-            <a:br>
-              <a:rPr lang="en-US" sz="2200" dirty="0">
-                <a:solidFill>
-                  <a:schemeClr val="bg1"/>
-                </a:solidFill>
-              </a:rPr>
-            </a:br>
-            <a:r>
-              <a:rPr lang="en-US" sz="2200" dirty="0">
-                <a:solidFill>
-                  <a:schemeClr val="bg1"/>
-                </a:solidFill>
-              </a:rPr>
-              <a:t>&gt; and I answered "you mean a '</a:t>
-            </a:r>
-            <a:r>
-              <a:rPr lang="en-US" sz="2200" dirty="0" err="1">
-                <a:solidFill>
-                  <a:schemeClr val="bg1"/>
-                </a:solidFill>
-              </a:rPr>
-              <a:t>Mazeltov</a:t>
-            </a:r>
-            <a:r>
-              <a:rPr lang="en-US" sz="2200" dirty="0">
-                <a:solidFill>
-                  <a:schemeClr val="bg1"/>
-                </a:solidFill>
-              </a:rPr>
-              <a:t> Cocktail'?"</a:t>
-            </a:r>
-          </a:p>
-          <a:p>
-            <a:pPr>
-              <a:spcBef>
-                <a:spcPct val="50000"/>
-              </a:spcBef>
-            </a:pPr>
-            <a:endParaRPr lang="en-US" sz="2200" dirty="0"/>
-          </a:p>
-        </p:txBody>
-      </p:sp>
-      <p:sp>
-        <p:nvSpPr>
-          <p:cNvPr id="4" name="TextBox 3"/>
-          <p:cNvSpPr txBox="1"/>
-          <p:nvPr/>
-        </p:nvSpPr>
-        <p:spPr>
-          <a:xfrm>
-            <a:off x="1752600" y="4923493"/>
-            <a:ext cx="7924800" cy="461665"/>
-          </a:xfrm>
-          <a:prstGeom prst="rect">
-            <a:avLst/>
-          </a:prstGeom>
-          <a:noFill/>
-        </p:spPr>
-        <p:txBody>
-          <a:bodyPr wrap="square" rtlCol="0">
-            <a:spAutoFit/>
-          </a:bodyPr>
-          <a:lstStyle/>
-          <a:p>
-            <a:r>
-              <a:rPr lang="en-US" dirty="0">
-                <a:solidFill>
-                  <a:srgbClr val="FFFF00"/>
-                </a:solidFill>
-              </a:rPr>
-              <a:t>http://www.netfunny.com/rhf/jokes/97/Sep/cocktail.html</a:t>
-            </a:r>
-          </a:p>
-        </p:txBody>
-      </p:sp>
-    </p:spTree>
-    <p:extLst>
-      <p:ext uri="{BB962C8B-B14F-4D97-AF65-F5344CB8AC3E}">
-        <p14:creationId xmlns:p14="http://schemas.microsoft.com/office/powerpoint/2010/main" val="3615992431"/>
-      </p:ext>
-    </p:extLst>
-  </p:cSld>
-  <p:clrMapOvr>
-    <a:masterClrMapping/>
-  </p:clrMapOvr>
 </p:sld>
 </file>
 

</xml_diff>

<commit_message>
slightly revised occurs bound slides
</commit_message>
<xml_diff>
--- a/ClassMaterials/OccursBound/12-OccursBound-LexAddr-reverse.pptx
+++ b/ClassMaterials/OccursBound/12-OccursBound-LexAddr-reverse.pptx
@@ -5,10 +5,10 @@
     <p:sldMasterId id="2147483781" r:id="rId1"/>
   </p:sldMasterIdLst>
   <p:notesMasterIdLst>
-    <p:notesMasterId r:id="rId21"/>
+    <p:notesMasterId r:id="rId18"/>
   </p:notesMasterIdLst>
   <p:handoutMasterIdLst>
-    <p:handoutMasterId r:id="rId22"/>
+    <p:handoutMasterId r:id="rId19"/>
   </p:handoutMasterIdLst>
   <p:sldIdLst>
     <p:sldId id="394" r:id="rId2"/>
@@ -27,9 +27,6 @@
     <p:sldId id="403" r:id="rId15"/>
     <p:sldId id="430" r:id="rId16"/>
     <p:sldId id="415" r:id="rId17"/>
-    <p:sldId id="392" r:id="rId18"/>
-    <p:sldId id="370" r:id="rId19"/>
-    <p:sldId id="371" r:id="rId20"/>
   </p:sldIdLst>
   <p:sldSz cx="12192000" cy="6858000"/>
   <p:notesSz cx="7315200" cy="9601200"/>
@@ -995,101 +992,6 @@
     <p:extLst>
       <p:ext uri="{BB962C8B-B14F-4D97-AF65-F5344CB8AC3E}">
         <p14:creationId xmlns:p14="http://schemas.microsoft.com/office/powerpoint/2010/main" val="310700449"/>
-      </p:ext>
-    </p:extLst>
-  </p:cSld>
-  <p:clrMapOvr>
-    <a:masterClrMapping/>
-  </p:clrMapOvr>
-</p:notes>
-</file>
-
-<file path=ppt/notesSlides/notesSlide11.xml><?xml version="1.0" encoding="utf-8"?>
-<p:notes xmlns:a="http://schemas.openxmlformats.org/drawingml/2006/main" xmlns:r="http://schemas.openxmlformats.org/officeDocument/2006/relationships" xmlns:p="http://schemas.openxmlformats.org/presentationml/2006/main">
-  <p:cSld>
-    <p:spTree>
-      <p:nvGrpSpPr>
-        <p:cNvPr id="1" name=""/>
-        <p:cNvGrpSpPr/>
-        <p:nvPr/>
-      </p:nvGrpSpPr>
-      <p:grpSpPr>
-        <a:xfrm>
-          <a:off x="0" y="0"/>
-          <a:ext cx="0" cy="0"/>
-          <a:chOff x="0" y="0"/>
-          <a:chExt cx="0" cy="0"/>
-        </a:xfrm>
-      </p:grpSpPr>
-      <p:sp>
-        <p:nvSpPr>
-          <p:cNvPr id="2" name="Slide Image Placeholder 1"/>
-          <p:cNvSpPr>
-            <a:spLocks noGrp="1" noRot="1" noChangeAspect="1"/>
-          </p:cNvSpPr>
-          <p:nvPr>
-            <p:ph type="sldImg"/>
-          </p:nvPr>
-        </p:nvSpPr>
-        <p:spPr/>
-      </p:sp>
-      <p:sp>
-        <p:nvSpPr>
-          <p:cNvPr id="3" name="Notes Placeholder 2"/>
-          <p:cNvSpPr>
-            <a:spLocks noGrp="1"/>
-          </p:cNvSpPr>
-          <p:nvPr>
-            <p:ph type="body" idx="1"/>
-          </p:nvPr>
-        </p:nvSpPr>
-        <p:spPr/>
-        <p:txBody>
-          <a:bodyPr>
-            <a:normAutofit/>
-          </a:bodyPr>
-          <a:lstStyle/>
-          <a:p>
-            <a:r>
-              <a:rPr lang="en-US" dirty="0"/>
-              <a:t>Suggestion for 2011:</a:t>
-            </a:r>
-            <a:r>
-              <a:rPr lang="en-US" baseline="0" dirty="0"/>
-              <a:t>  Email  a link to the Exam slides to students on Wednesday, so there is no need to spend much time on them in class. </a:t>
-            </a:r>
-            <a:endParaRPr lang="en-US" dirty="0"/>
-          </a:p>
-        </p:txBody>
-      </p:sp>
-      <p:sp>
-        <p:nvSpPr>
-          <p:cNvPr id="4" name="Slide Number Placeholder 3"/>
-          <p:cNvSpPr>
-            <a:spLocks noGrp="1"/>
-          </p:cNvSpPr>
-          <p:nvPr>
-            <p:ph type="sldNum" sz="quarter" idx="10"/>
-          </p:nvPr>
-        </p:nvSpPr>
-        <p:spPr/>
-        <p:txBody>
-          <a:bodyPr/>
-          <a:lstStyle/>
-          <a:p>
-            <a:fld id="{D2B72A2D-1FB5-4235-BD2A-A47C126380AE}" type="slidenum">
-              <a:rPr lang="en-US" smtClean="0"/>
-              <a:pPr/>
-              <a:t>18</a:t>
-            </a:fld>
-            <a:endParaRPr lang="en-US"/>
-          </a:p>
-        </p:txBody>
-      </p:sp>
-    </p:spTree>
-    <p:extLst>
-      <p:ext uri="{BB962C8B-B14F-4D97-AF65-F5344CB8AC3E}">
-        <p14:creationId xmlns:p14="http://schemas.microsoft.com/office/powerpoint/2010/main" val="593431736"/>
       </p:ext>
     </p:extLst>
   </p:cSld>
@@ -5548,26 +5450,59 @@
             <a:spLocks noGrp="1" noChangeArrowheads="1"/>
           </p:cNvSpPr>
           <p:nvPr>
-            <p:ph type="ctrTitle"/>
+            <p:ph type="title"/>
           </p:nvPr>
         </p:nvSpPr>
         <p:spPr>
           <a:xfrm>
-            <a:off x="2209800" y="533400"/>
-            <a:ext cx="7772400" cy="1555750"/>
+            <a:off x="609601" y="273050"/>
+            <a:ext cx="4011084" cy="1162050"/>
           </a:xfrm>
         </p:spPr>
         <p:txBody>
-          <a:bodyPr/>
+          <a:bodyPr wrap="square" anchor="b">
+            <a:normAutofit/>
+          </a:bodyPr>
           <a:lstStyle/>
           <a:p>
             <a:r>
-              <a:rPr lang="en-US" b="1" dirty="0"/>
-              <a:t>CSSE 304 Day 12</a:t>
+              <a:rPr lang="en-US" sz="3600" b="1" dirty="0"/>
+              <a:t>Occurs Bound</a:t>
             </a:r>
           </a:p>
         </p:txBody>
       </p:sp>
+      <p:pic>
+        <p:nvPicPr>
+          <p:cNvPr id="3" name="Picture 2">
+            <a:extLst>
+              <a:ext uri="{FF2B5EF4-FFF2-40B4-BE49-F238E27FC236}">
+                <a16:creationId xmlns:a16="http://schemas.microsoft.com/office/drawing/2014/main" id="{52F7E971-A8BF-D12F-4167-3EAAE6F4E6E6}"/>
+              </a:ext>
+            </a:extLst>
+          </p:cNvPr>
+          <p:cNvPicPr>
+            <a:picLocks noChangeAspect="1"/>
+          </p:cNvPicPr>
+          <p:nvPr/>
+        </p:nvPicPr>
+        <p:blipFill>
+          <a:blip r:embed="rId3"/>
+          <a:stretch>
+            <a:fillRect/>
+          </a:stretch>
+        </p:blipFill>
+        <p:spPr>
+          <a:xfrm>
+            <a:off x="5248010" y="273051"/>
+            <a:ext cx="5853113" cy="5853113"/>
+          </a:xfrm>
+          <a:prstGeom prst="rect">
+            <a:avLst/>
+          </a:prstGeom>
+          <a:noFill/>
+        </p:spPr>
+      </p:pic>
       <p:sp>
         <p:nvSpPr>
           <p:cNvPr id="363523" name="Rectangle 3"/>
@@ -5575,42 +5510,27 @@
             <a:spLocks noGrp="1" noChangeArrowheads="1"/>
           </p:cNvSpPr>
           <p:nvPr>
-            <p:ph type="subTitle" idx="1"/>
+            <p:ph type="body" sz="half" idx="2"/>
           </p:nvPr>
         </p:nvSpPr>
         <p:spPr>
           <a:xfrm>
-            <a:off x="1524000" y="2667000"/>
-            <a:ext cx="8763000" cy="1752600"/>
+            <a:off x="609601" y="1435101"/>
+            <a:ext cx="4011084" cy="3746499"/>
           </a:xfrm>
         </p:spPr>
         <p:txBody>
-          <a:bodyPr/>
+          <a:bodyPr wrap="square" anchor="t">
+            <a:normAutofit/>
+          </a:bodyPr>
           <a:lstStyle/>
           <a:p>
-            <a:pPr>
-              <a:lnSpc>
-                <a:spcPct val="90000"/>
-              </a:lnSpc>
-            </a:pPr>
             <a:r>
               <a:rPr lang="en-US" dirty="0"/>
-              <a:t>Efficient </a:t>
-            </a:r>
-            <a:r>
-              <a:rPr lang="en-US" dirty="0">
-                <a:latin typeface="Courier New" panose="02070309020205020404" pitchFamily="49" charset="0"/>
-                <a:cs typeface="Courier New" panose="02070309020205020404" pitchFamily="49" charset="0"/>
-              </a:rPr>
-              <a:t>rotate</a:t>
-            </a:r>
-          </a:p>
-          <a:p>
-            <a:pPr>
-              <a:lnSpc>
-                <a:spcPct val="90000"/>
-              </a:lnSpc>
-            </a:pPr>
+              <a:t>Efficient rotate</a:t>
+            </a:r>
+          </a:p>
+          <a:p>
             <a:r>
               <a:rPr lang="en-US" dirty="0"/>
               <a:t>Review free and bound variables </a:t>
@@ -5620,97 +5540,187 @@
             </a:br>
             <a:r>
               <a:rPr lang="en-US" dirty="0"/>
-              <a:t>write </a:t>
-            </a:r>
-            <a:r>
-              <a:rPr lang="en-US" dirty="0">
-                <a:latin typeface="Courier New" panose="02070309020205020404" pitchFamily="49" charset="0"/>
-                <a:cs typeface="Courier New" panose="02070309020205020404" pitchFamily="49" charset="0"/>
-              </a:rPr>
-              <a:t>occurs-bound?</a:t>
-            </a:r>
-          </a:p>
-          <a:p>
-            <a:pPr>
-              <a:lnSpc>
-                <a:spcPct val="90000"/>
-              </a:lnSpc>
-            </a:pPr>
+              <a:t>write occurs-bound?</a:t>
+            </a:r>
+          </a:p>
+          <a:p>
             <a:r>
               <a:rPr lang="en-US" dirty="0"/>
               <a:t>Lexical address</a:t>
             </a:r>
           </a:p>
           <a:p>
-            <a:pPr>
+            <a:endParaRPr lang="en-US" dirty="0"/>
+          </a:p>
+        </p:txBody>
+      </p:sp>
+      <p:sp>
+        <p:nvSpPr>
+          <p:cNvPr id="4" name="TextBox 3">
+            <a:extLst>
+              <a:ext uri="{FF2B5EF4-FFF2-40B4-BE49-F238E27FC236}">
+                <a16:creationId xmlns:a16="http://schemas.microsoft.com/office/drawing/2014/main" id="{A870387F-D214-963B-1D8F-7558868CAF30}"/>
+              </a:ext>
+            </a:extLst>
+          </p:cNvPr>
+          <p:cNvSpPr txBox="1"/>
+          <p:nvPr/>
+        </p:nvSpPr>
+        <p:spPr>
+          <a:xfrm>
+            <a:off x="244723" y="6172200"/>
+            <a:ext cx="6097836" cy="880369"/>
+          </a:xfrm>
+          <a:prstGeom prst="rect">
+            <a:avLst/>
+          </a:prstGeom>
+          <a:noFill/>
+        </p:spPr>
+        <p:txBody>
+          <a:bodyPr wrap="square">
+            <a:spAutoFit/>
+          </a:bodyPr>
+          <a:lstStyle/>
+          <a:p>
+            <a:pPr marL="0" marR="0" indent="0" algn="l">
               <a:lnSpc>
-                <a:spcPct val="90000"/>
+                <a:spcPct val="119000"/>
               </a:lnSpc>
+              <a:spcBef>
+                <a:spcPts val="0"/>
+              </a:spcBef>
+              <a:spcAft>
+                <a:spcPts val="600"/>
+              </a:spcAft>
             </a:pPr>
             <a:r>
-              <a:rPr lang="en-US" dirty="0"/>
-              <a:t>(if there is time) </a:t>
-            </a:r>
-            <a:r>
-              <a:rPr lang="en-US" dirty="0">
-                <a:latin typeface="Courier New" panose="02070309020205020404" pitchFamily="49" charset="0"/>
-                <a:cs typeface="Courier New" panose="02070309020205020404" pitchFamily="49" charset="0"/>
-              </a:rPr>
-              <a:t>reverse</a:t>
-            </a:r>
-            <a:r>
-              <a:rPr lang="en-US" dirty="0"/>
-              <a:t> and </a:t>
-            </a:r>
-            <a:r>
-              <a:rPr lang="en-US" dirty="0">
-                <a:latin typeface="Courier New" panose="02070309020205020404" pitchFamily="49" charset="0"/>
-                <a:cs typeface="Courier New" panose="02070309020205020404" pitchFamily="49" charset="0"/>
-              </a:rPr>
-              <a:t>reverse!</a:t>
-            </a:r>
-          </a:p>
-          <a:p>
-            <a:pPr>
+              <a:rPr lang="en-US" sz="1100" kern="1400" dirty="0">
+                <a:ln>
+                  <a:noFill/>
+                </a:ln>
+                <a:solidFill>
+                  <a:srgbClr val="000000"/>
+                </a:solidFill>
+                <a:effectLst/>
+                <a:latin typeface="Verdana" panose="020B0604030504040204" pitchFamily="34" charset="0"/>
+              </a:rPr>
+              <a:t>Art by Helvetica Blanc (</a:t>
+            </a:r>
+            <a:r>
+              <a:rPr lang="en-US" sz="1100" u="sng" kern="1400" dirty="0">
+                <a:ln>
+                  <a:noFill/>
+                </a:ln>
+                <a:solidFill>
+                  <a:srgbClr val="085296"/>
+                </a:solidFill>
+                <a:effectLst/>
+                <a:latin typeface="Verdana" panose="020B0604030504040204" pitchFamily="34" charset="0"/>
+                <a:hlinkClick r:id="rId4"/>
+              </a:rPr>
+              <a:t>https://helveticablanc.com</a:t>
+            </a:r>
+            <a:r>
+              <a:rPr lang="en-US" sz="1100" kern="1400" dirty="0">
+                <a:ln>
+                  <a:noFill/>
+                </a:ln>
+                <a:solidFill>
+                  <a:srgbClr val="000000"/>
+                </a:solidFill>
+                <a:effectLst/>
+                <a:latin typeface="Verdana" panose="020B0604030504040204" pitchFamily="34" charset="0"/>
+              </a:rPr>
+              <a:t>).  Licensed under a Creative Commons Attribution-</a:t>
+            </a:r>
+            <a:r>
+              <a:rPr lang="en-US" sz="1100" kern="1400" dirty="0" err="1">
+                <a:ln>
+                  <a:noFill/>
+                </a:ln>
+                <a:solidFill>
+                  <a:srgbClr val="000000"/>
+                </a:solidFill>
+                <a:effectLst/>
+                <a:latin typeface="Verdana" panose="020B0604030504040204" pitchFamily="34" charset="0"/>
+              </a:rPr>
+              <a:t>NonCommercial</a:t>
+            </a:r>
+            <a:r>
+              <a:rPr lang="en-US" sz="1100" kern="1400" dirty="0">
+                <a:ln>
+                  <a:noFill/>
+                </a:ln>
+                <a:solidFill>
+                  <a:srgbClr val="000000"/>
+                </a:solidFill>
+                <a:effectLst/>
+                <a:latin typeface="Verdana" panose="020B0604030504040204" pitchFamily="34" charset="0"/>
+              </a:rPr>
+              <a:t>-</a:t>
+            </a:r>
+            <a:r>
+              <a:rPr lang="en-US" sz="1100" kern="1400" dirty="0" err="1">
+                <a:ln>
+                  <a:noFill/>
+                </a:ln>
+                <a:solidFill>
+                  <a:srgbClr val="000000"/>
+                </a:solidFill>
+                <a:effectLst/>
+                <a:latin typeface="Verdana" panose="020B0604030504040204" pitchFamily="34" charset="0"/>
+              </a:rPr>
+              <a:t>ShareAlike</a:t>
+            </a:r>
+            <a:r>
+              <a:rPr lang="en-US" sz="1100" kern="1400" dirty="0">
+                <a:ln>
+                  <a:noFill/>
+                </a:ln>
+                <a:solidFill>
+                  <a:srgbClr val="000000"/>
+                </a:solidFill>
+                <a:effectLst/>
+                <a:latin typeface="Verdana" panose="020B0604030504040204" pitchFamily="34" charset="0"/>
+              </a:rPr>
+              <a:t> 4.0 International license.</a:t>
+            </a:r>
+            <a:endParaRPr lang="en-US" sz="1100" kern="1400" dirty="0">
+              <a:ln>
+                <a:noFill/>
+              </a:ln>
+              <a:solidFill>
+                <a:srgbClr val="000000"/>
+              </a:solidFill>
+              <a:effectLst/>
+              <a:latin typeface="Calibri" panose="020F0502020204030204" pitchFamily="34" charset="0"/>
+            </a:endParaRPr>
+          </a:p>
+          <a:p>
+            <a:pPr marL="0" marR="0" indent="0" algn="l">
               <a:lnSpc>
-                <a:spcPct val="90000"/>
+                <a:spcPct val="119000"/>
               </a:lnSpc>
+              <a:spcBef>
+                <a:spcPts val="0"/>
+              </a:spcBef>
+              <a:spcAft>
+                <a:spcPts val="600"/>
+              </a:spcAft>
             </a:pPr>
-            <a:endParaRPr lang="en-US" dirty="0">
-              <a:latin typeface="Courier New" panose="02070309020205020404" pitchFamily="49" charset="0"/>
-              <a:cs typeface="Courier New" panose="02070309020205020404" pitchFamily="49" charset="0"/>
-            </a:endParaRPr>
-          </a:p>
-          <a:p>
-            <a:pPr>
-              <a:lnSpc>
-                <a:spcPct val="90000"/>
-              </a:lnSpc>
-            </a:pPr>
-            <a:r>
-              <a:rPr lang="en-US" b="1" dirty="0">
-                <a:solidFill>
-                  <a:srgbClr val="66CCFF"/>
-                </a:solidFill>
-              </a:rPr>
-              <a:t>Answers to student questions</a:t>
-            </a:r>
-          </a:p>
-          <a:p>
-            <a:pPr>
-              <a:lnSpc>
-                <a:spcPct val="90000"/>
-              </a:lnSpc>
-            </a:pPr>
-            <a:endParaRPr lang="en-US" dirty="0"/>
-          </a:p>
-          <a:p>
-            <a:pPr>
-              <a:lnSpc>
-                <a:spcPct val="90000"/>
-              </a:lnSpc>
-            </a:pPr>
-            <a:endParaRPr lang="en-US" dirty="0"/>
+            <a:r>
+              <a:rPr lang="en-US" sz="1800" kern="1400" dirty="0">
+                <a:ln>
+                  <a:noFill/>
+                </a:ln>
+                <a:solidFill>
+                  <a:srgbClr val="000000"/>
+                </a:solidFill>
+                <a:effectLst/>
+                <a:latin typeface="Calibri" panose="020F0502020204030204" pitchFamily="34" charset="0"/>
+              </a:rPr>
+              <a:t> </a:t>
+            </a:r>
           </a:p>
         </p:txBody>
       </p:sp>
@@ -8432,715 +8442,6 @@
   <p:clrMapOvr>
     <a:masterClrMapping/>
   </p:clrMapOvr>
-</p:sld>
-</file>
-
-<file path=ppt/slides/slide17.xml><?xml version="1.0" encoding="utf-8"?>
-<p:sld xmlns:a="http://schemas.openxmlformats.org/drawingml/2006/main" xmlns:r="http://schemas.openxmlformats.org/officeDocument/2006/relationships" xmlns:p="http://schemas.openxmlformats.org/presentationml/2006/main" show="0">
-  <p:cSld>
-    <p:spTree>
-      <p:nvGrpSpPr>
-        <p:cNvPr id="1" name=""/>
-        <p:cNvGrpSpPr/>
-        <p:nvPr/>
-      </p:nvGrpSpPr>
-      <p:grpSpPr>
-        <a:xfrm>
-          <a:off x="0" y="0"/>
-          <a:ext cx="0" cy="0"/>
-          <a:chOff x="0" y="0"/>
-          <a:chExt cx="0" cy="0"/>
-        </a:xfrm>
-      </p:grpSpPr>
-      <p:sp>
-        <p:nvSpPr>
-          <p:cNvPr id="2" name="Title 1"/>
-          <p:cNvSpPr>
-            <a:spLocks noGrp="1"/>
-          </p:cNvSpPr>
-          <p:nvPr>
-            <p:ph type="title"/>
-          </p:nvPr>
-        </p:nvSpPr>
-        <p:spPr>
-          <a:xfrm>
-            <a:off x="2133600" y="-228600"/>
-            <a:ext cx="7772400" cy="1066800"/>
-          </a:xfrm>
-        </p:spPr>
-        <p:txBody>
-          <a:bodyPr/>
-          <a:lstStyle/>
-          <a:p>
-            <a:r>
-              <a:rPr lang="en-US" dirty="0"/>
-              <a:t>Interlude</a:t>
-            </a:r>
-          </a:p>
-        </p:txBody>
-      </p:sp>
-      <p:pic>
-        <p:nvPicPr>
-          <p:cNvPr id="4" name="Content Placeholder 3" descr="CashForFlunkers.gif"/>
-          <p:cNvPicPr>
-            <a:picLocks noGrp="1" noChangeAspect="1"/>
-          </p:cNvPicPr>
-          <p:nvPr>
-            <p:ph idx="1"/>
-          </p:nvPr>
-        </p:nvPicPr>
-        <p:blipFill>
-          <a:blip r:embed="rId2" cstate="print"/>
-          <a:stretch>
-            <a:fillRect/>
-          </a:stretch>
-        </p:blipFill>
-        <p:spPr>
-          <a:xfrm>
-            <a:off x="2667000" y="685801"/>
-            <a:ext cx="6096000" cy="1838325"/>
-          </a:xfrm>
-        </p:spPr>
-      </p:pic>
-      <p:pic>
-        <p:nvPicPr>
-          <p:cNvPr id="1026" name="Picture 2" descr="C:\Documents and Settings\anderson\My Documents\Humor\Cartoons\FrankAndErnest\change_machine.gif"/>
-          <p:cNvPicPr>
-            <a:picLocks noChangeAspect="1" noChangeArrowheads="1"/>
-          </p:cNvPicPr>
-          <p:nvPr/>
-        </p:nvPicPr>
-        <p:blipFill>
-          <a:blip r:embed="rId3" cstate="print"/>
-          <a:srcRect/>
-          <a:stretch>
-            <a:fillRect/>
-          </a:stretch>
-        </p:blipFill>
-        <p:spPr bwMode="auto">
-          <a:xfrm>
-            <a:off x="2667000" y="2743201"/>
-            <a:ext cx="6096000" cy="1838325"/>
-          </a:xfrm>
-          <a:prstGeom prst="rect">
-            <a:avLst/>
-          </a:prstGeom>
-          <a:noFill/>
-        </p:spPr>
-      </p:pic>
-      <p:pic>
-        <p:nvPicPr>
-          <p:cNvPr id="6" name="Picture 5" descr="EverythingLooksLikeAHammer.gif"/>
-          <p:cNvPicPr>
-            <a:picLocks noChangeAspect="1"/>
-          </p:cNvPicPr>
-          <p:nvPr/>
-        </p:nvPicPr>
-        <p:blipFill>
-          <a:blip r:embed="rId4" cstate="print"/>
-          <a:stretch>
-            <a:fillRect/>
-          </a:stretch>
-        </p:blipFill>
-        <p:spPr>
-          <a:xfrm>
-            <a:off x="2590800" y="4800600"/>
-            <a:ext cx="6096000" cy="1809750"/>
-          </a:xfrm>
-          <a:prstGeom prst="rect">
-            <a:avLst/>
-          </a:prstGeom>
-        </p:spPr>
-      </p:pic>
-      <p:sp>
-        <p:nvSpPr>
-          <p:cNvPr id="3" name="Rectangle 2">
-            <a:extLst>
-              <a:ext uri="{FF2B5EF4-FFF2-40B4-BE49-F238E27FC236}">
-                <a16:creationId xmlns:a16="http://schemas.microsoft.com/office/drawing/2014/main" id="{2BE62597-7825-4AEB-9295-A88E785A714D}"/>
-              </a:ext>
-            </a:extLst>
-          </p:cNvPr>
-          <p:cNvSpPr/>
-          <p:nvPr/>
-        </p:nvSpPr>
-        <p:spPr>
-          <a:xfrm>
-            <a:off x="5839359" y="3198168"/>
-            <a:ext cx="513282" cy="461665"/>
-          </a:xfrm>
-          <a:prstGeom prst="rect">
-            <a:avLst/>
-          </a:prstGeom>
-        </p:spPr>
-        <p:txBody>
-          <a:bodyPr wrap="none">
-            <a:spAutoFit/>
-          </a:bodyPr>
-          <a:lstStyle/>
-          <a:p>
-            <a:r>
-              <a:rPr lang="en-US" b="1" dirty="0">
-                <a:solidFill>
-                  <a:srgbClr val="FFFF00"/>
-                </a:solidFill>
-                <a:latin typeface="Courier New" pitchFamily="49" charset="0"/>
-                <a:sym typeface="Wingdings" pitchFamily="2" charset="2"/>
-              </a:rPr>
-              <a:t></a:t>
-            </a:r>
-            <a:endParaRPr lang="en-US" dirty="0"/>
-          </a:p>
-        </p:txBody>
-      </p:sp>
-      <p:sp>
-        <p:nvSpPr>
-          <p:cNvPr id="5" name="Rectangle 4">
-            <a:extLst>
-              <a:ext uri="{FF2B5EF4-FFF2-40B4-BE49-F238E27FC236}">
-                <a16:creationId xmlns:a16="http://schemas.microsoft.com/office/drawing/2014/main" id="{DF5E7AAC-D617-4204-9E69-5F86EE6B240F}"/>
-              </a:ext>
-            </a:extLst>
-          </p:cNvPr>
-          <p:cNvSpPr/>
-          <p:nvPr/>
-        </p:nvSpPr>
-        <p:spPr>
-          <a:xfrm>
-            <a:off x="5839359" y="3198168"/>
-            <a:ext cx="513282" cy="461665"/>
-          </a:xfrm>
-          <a:prstGeom prst="rect">
-            <a:avLst/>
-          </a:prstGeom>
-        </p:spPr>
-        <p:txBody>
-          <a:bodyPr wrap="none">
-            <a:spAutoFit/>
-          </a:bodyPr>
-          <a:lstStyle/>
-          <a:p>
-            <a:r>
-              <a:rPr lang="en-US" b="1" dirty="0">
-                <a:solidFill>
-                  <a:srgbClr val="FFFF00"/>
-                </a:solidFill>
-                <a:latin typeface="Courier New" pitchFamily="49" charset="0"/>
-                <a:sym typeface="Wingdings" pitchFamily="2" charset="2"/>
-              </a:rPr>
-              <a:t></a:t>
-            </a:r>
-            <a:endParaRPr lang="en-US" dirty="0"/>
-          </a:p>
-        </p:txBody>
-      </p:sp>
-    </p:spTree>
-    <p:extLst>
-      <p:ext uri="{BB962C8B-B14F-4D97-AF65-F5344CB8AC3E}">
-        <p14:creationId xmlns:p14="http://schemas.microsoft.com/office/powerpoint/2010/main" val="2541262792"/>
-      </p:ext>
-    </p:extLst>
-  </p:cSld>
-  <p:clrMapOvr>
-    <a:masterClrMapping/>
-  </p:clrMapOvr>
-</p:sld>
-</file>
-
-<file path=ppt/slides/slide18.xml><?xml version="1.0" encoding="utf-8"?>
-<p:sld xmlns:a="http://schemas.openxmlformats.org/drawingml/2006/main" xmlns:r="http://schemas.openxmlformats.org/officeDocument/2006/relationships" xmlns:p="http://schemas.openxmlformats.org/presentationml/2006/main">
-  <p:cSld>
-    <p:spTree>
-      <p:nvGrpSpPr>
-        <p:cNvPr id="1" name=""/>
-        <p:cNvGrpSpPr/>
-        <p:nvPr/>
-      </p:nvGrpSpPr>
-      <p:grpSpPr>
-        <a:xfrm>
-          <a:off x="0" y="0"/>
-          <a:ext cx="0" cy="0"/>
-          <a:chOff x="0" y="0"/>
-          <a:chExt cx="0" cy="0"/>
-        </a:xfrm>
-      </p:grpSpPr>
-      <p:sp>
-        <p:nvSpPr>
-          <p:cNvPr id="549890" name="Rectangle 2"/>
-          <p:cNvSpPr>
-            <a:spLocks noGrp="1" noChangeArrowheads="1"/>
-          </p:cNvSpPr>
-          <p:nvPr>
-            <p:ph type="title"/>
-          </p:nvPr>
-        </p:nvSpPr>
-        <p:spPr>
-          <a:xfrm>
-            <a:off x="1905000" y="152400"/>
-            <a:ext cx="7772400" cy="457200"/>
-          </a:xfrm>
-        </p:spPr>
-        <p:txBody>
-          <a:bodyPr/>
-          <a:lstStyle/>
-          <a:p>
-            <a:r>
-              <a:rPr lang="en-US" sz="4000" dirty="0"/>
-              <a:t>In-class exercise (if there is time) </a:t>
-            </a:r>
-          </a:p>
-        </p:txBody>
-      </p:sp>
-      <p:sp>
-        <p:nvSpPr>
-          <p:cNvPr id="549891" name="Rectangle 3"/>
-          <p:cNvSpPr>
-            <a:spLocks noGrp="1" noChangeArrowheads="1"/>
-          </p:cNvSpPr>
-          <p:nvPr>
-            <p:ph type="body" idx="1"/>
-          </p:nvPr>
-        </p:nvSpPr>
-        <p:spPr>
-          <a:xfrm>
-            <a:off x="1828800" y="762000"/>
-            <a:ext cx="3733800" cy="3124200"/>
-          </a:xfrm>
-          <a:noFill/>
-          <a:ln w="25400">
-            <a:solidFill>
-              <a:srgbClr val="339966"/>
-            </a:solidFill>
-          </a:ln>
-        </p:spPr>
-        <p:txBody>
-          <a:bodyPr/>
-          <a:lstStyle/>
-          <a:p>
-            <a:pPr>
-              <a:lnSpc>
-                <a:spcPct val="80000"/>
-              </a:lnSpc>
-            </a:pPr>
-            <a:r>
-              <a:rPr lang="en-US" sz="2400" dirty="0"/>
-              <a:t>write </a:t>
-            </a:r>
-            <a:r>
-              <a:rPr lang="en-US" sz="2400" dirty="0">
-                <a:latin typeface="Courier New" pitchFamily="49" charset="0"/>
-              </a:rPr>
-              <a:t>reverse</a:t>
-            </a:r>
-            <a:r>
-              <a:rPr lang="en-US" sz="2400" dirty="0"/>
-              <a:t> and </a:t>
-            </a:r>
-            <a:r>
-              <a:rPr lang="en-US" sz="2400" dirty="0">
-                <a:latin typeface="Courier New" pitchFamily="49" charset="0"/>
-              </a:rPr>
-              <a:t>reverse!</a:t>
-            </a:r>
-            <a:r>
-              <a:rPr lang="en-US" sz="2400" dirty="0"/>
-              <a:t> procedures</a:t>
-            </a:r>
-          </a:p>
-          <a:p>
-            <a:pPr>
-              <a:lnSpc>
-                <a:spcPct val="80000"/>
-              </a:lnSpc>
-            </a:pPr>
-            <a:r>
-              <a:rPr lang="en-US" sz="2400" dirty="0"/>
-              <a:t>For </a:t>
-            </a:r>
-            <a:r>
-              <a:rPr lang="en-US" sz="2400" dirty="0">
-                <a:latin typeface="Courier New" pitchFamily="49" charset="0"/>
-              </a:rPr>
-              <a:t>reverse!</a:t>
-            </a:r>
-            <a:r>
-              <a:rPr lang="en-US" sz="2400" dirty="0"/>
-              <a:t>, you will need to use </a:t>
-            </a:r>
-            <a:r>
-              <a:rPr lang="en-US" sz="2400" dirty="0">
-                <a:latin typeface="Courier New" pitchFamily="49" charset="0"/>
-              </a:rPr>
-              <a:t>set-</a:t>
-            </a:r>
-            <a:r>
-              <a:rPr lang="en-US" sz="2400" dirty="0" err="1">
-                <a:latin typeface="Courier New" pitchFamily="49" charset="0"/>
-              </a:rPr>
-              <a:t>cdr</a:t>
-            </a:r>
-            <a:r>
-              <a:rPr lang="en-US" sz="2400" dirty="0">
-                <a:latin typeface="Courier New" pitchFamily="49" charset="0"/>
-              </a:rPr>
-              <a:t>!</a:t>
-            </a:r>
-          </a:p>
-          <a:p>
-            <a:pPr>
-              <a:lnSpc>
-                <a:spcPct val="80000"/>
-              </a:lnSpc>
-            </a:pPr>
-            <a:r>
-              <a:rPr lang="en-US" sz="2400" dirty="0"/>
-              <a:t>Both should be O(n).</a:t>
-            </a:r>
-          </a:p>
-          <a:p>
-            <a:pPr>
-              <a:lnSpc>
-                <a:spcPct val="80000"/>
-              </a:lnSpc>
-            </a:pPr>
-            <a:r>
-              <a:rPr lang="en-US" sz="2400" dirty="0"/>
-              <a:t>These transcripts might help you to distinguish between them.</a:t>
-            </a:r>
-          </a:p>
-        </p:txBody>
-      </p:sp>
-      <p:pic>
-        <p:nvPicPr>
-          <p:cNvPr id="549892" name="Picture 4"/>
-          <p:cNvPicPr>
-            <a:picLocks noChangeAspect="1" noChangeArrowheads="1"/>
-          </p:cNvPicPr>
-          <p:nvPr/>
-        </p:nvPicPr>
-        <p:blipFill>
-          <a:blip r:embed="rId3" cstate="print"/>
-          <a:srcRect/>
-          <a:stretch>
-            <a:fillRect/>
-          </a:stretch>
-        </p:blipFill>
-        <p:spPr bwMode="auto">
-          <a:xfrm>
-            <a:off x="1676400" y="4038601"/>
-            <a:ext cx="4495800" cy="2663825"/>
-          </a:xfrm>
-          <a:prstGeom prst="rect">
-            <a:avLst/>
-          </a:prstGeom>
-          <a:noFill/>
-          <a:ln w="9525">
-            <a:solidFill>
-              <a:srgbClr val="0000FF"/>
-            </a:solidFill>
-            <a:miter lim="800000"/>
-            <a:headEnd/>
-            <a:tailEnd/>
-          </a:ln>
-          <a:effectLst/>
-        </p:spPr>
-      </p:pic>
-      <p:pic>
-        <p:nvPicPr>
-          <p:cNvPr id="549893" name="Picture 5"/>
-          <p:cNvPicPr>
-            <a:picLocks noChangeAspect="1" noChangeArrowheads="1"/>
-          </p:cNvPicPr>
-          <p:nvPr/>
-        </p:nvPicPr>
-        <p:blipFill>
-          <a:blip r:embed="rId4" cstate="print"/>
-          <a:srcRect/>
-          <a:stretch>
-            <a:fillRect/>
-          </a:stretch>
-        </p:blipFill>
-        <p:spPr bwMode="auto">
-          <a:xfrm>
-            <a:off x="5715000" y="804864"/>
-            <a:ext cx="4800600" cy="4681537"/>
-          </a:xfrm>
-          <a:prstGeom prst="rect">
-            <a:avLst/>
-          </a:prstGeom>
-          <a:noFill/>
-          <a:ln w="19050">
-            <a:solidFill>
-              <a:srgbClr val="FF0000"/>
-            </a:solidFill>
-            <a:miter lim="800000"/>
-            <a:headEnd/>
-            <a:tailEnd/>
-          </a:ln>
-          <a:effectLst/>
-        </p:spPr>
-      </p:pic>
-      <p:sp>
-        <p:nvSpPr>
-          <p:cNvPr id="549894" name="Text Box 6"/>
-          <p:cNvSpPr txBox="1">
-            <a:spLocks noChangeArrowheads="1"/>
-          </p:cNvSpPr>
-          <p:nvPr/>
-        </p:nvSpPr>
-        <p:spPr bwMode="auto">
-          <a:xfrm>
-            <a:off x="6705600" y="5830653"/>
-            <a:ext cx="3962400" cy="830997"/>
-          </a:xfrm>
-          <a:prstGeom prst="rect">
-            <a:avLst/>
-          </a:prstGeom>
-          <a:noFill/>
-          <a:ln w="9525">
-            <a:noFill/>
-            <a:miter lim="800000"/>
-            <a:headEnd/>
-            <a:tailEnd/>
-          </a:ln>
-          <a:effectLst/>
-        </p:spPr>
-        <p:txBody>
-          <a:bodyPr>
-            <a:spAutoFit/>
-          </a:bodyPr>
-          <a:lstStyle/>
-          <a:p>
-            <a:pPr eaLnBrk="0" hangingPunct="0">
-              <a:spcBef>
-                <a:spcPct val="50000"/>
-              </a:spcBef>
-            </a:pPr>
-            <a:r>
-              <a:rPr lang="en-US" dirty="0">
-                <a:solidFill>
-                  <a:schemeClr val="bg1"/>
-                </a:solidFill>
-              </a:rPr>
-              <a:t>Do this with another student or two.</a:t>
-            </a:r>
-          </a:p>
-        </p:txBody>
-      </p:sp>
-    </p:spTree>
-    <p:extLst>
-      <p:ext uri="{BB962C8B-B14F-4D97-AF65-F5344CB8AC3E}">
-        <p14:creationId xmlns:p14="http://schemas.microsoft.com/office/powerpoint/2010/main" val="286097210"/>
-      </p:ext>
-    </p:extLst>
-  </p:cSld>
-  <p:clrMapOvr>
-    <a:masterClrMapping/>
-  </p:clrMapOvr>
-  <p:transition/>
-</p:sld>
-</file>
-
-<file path=ppt/slides/slide19.xml><?xml version="1.0" encoding="utf-8"?>
-<p:sld xmlns:a="http://schemas.openxmlformats.org/drawingml/2006/main" xmlns:r="http://schemas.openxmlformats.org/officeDocument/2006/relationships" xmlns:p="http://schemas.openxmlformats.org/presentationml/2006/main">
-  <p:cSld>
-    <p:spTree>
-      <p:nvGrpSpPr>
-        <p:cNvPr id="1" name=""/>
-        <p:cNvGrpSpPr/>
-        <p:nvPr/>
-      </p:nvGrpSpPr>
-      <p:grpSpPr>
-        <a:xfrm>
-          <a:off x="0" y="0"/>
-          <a:ext cx="0" cy="0"/>
-          <a:chOff x="0" y="0"/>
-          <a:chExt cx="0" cy="0"/>
-        </a:xfrm>
-      </p:grpSpPr>
-      <p:sp>
-        <p:nvSpPr>
-          <p:cNvPr id="550914" name="Rectangle 2"/>
-          <p:cNvSpPr>
-            <a:spLocks noGrp="1" noChangeArrowheads="1"/>
-          </p:cNvSpPr>
-          <p:nvPr>
-            <p:ph type="title"/>
-          </p:nvPr>
-        </p:nvSpPr>
-        <p:spPr>
-          <a:xfrm>
-            <a:off x="2209800" y="152400"/>
-            <a:ext cx="7772400" cy="738188"/>
-          </a:xfrm>
-        </p:spPr>
-        <p:txBody>
-          <a:bodyPr/>
-          <a:lstStyle/>
-          <a:p>
-            <a:r>
-              <a:rPr lang="en-US" dirty="0"/>
-              <a:t>Solutions</a:t>
-            </a:r>
-          </a:p>
-        </p:txBody>
-      </p:sp>
-      <p:pic>
-        <p:nvPicPr>
-          <p:cNvPr id="550915" name="Picture 3"/>
-          <p:cNvPicPr>
-            <a:picLocks noChangeAspect="1" noChangeArrowheads="1"/>
-          </p:cNvPicPr>
-          <p:nvPr/>
-        </p:nvPicPr>
-        <p:blipFill>
-          <a:blip r:embed="rId2" cstate="print"/>
-          <a:srcRect/>
-          <a:stretch>
-            <a:fillRect/>
-          </a:stretch>
-        </p:blipFill>
-        <p:spPr bwMode="auto">
-          <a:xfrm>
-            <a:off x="1066800" y="914400"/>
-            <a:ext cx="8229600" cy="2320925"/>
-          </a:xfrm>
-          <a:prstGeom prst="rect">
-            <a:avLst/>
-          </a:prstGeom>
-          <a:noFill/>
-          <a:ln w="53975">
-            <a:solidFill>
-              <a:schemeClr val="tx2"/>
-            </a:solidFill>
-            <a:miter lim="800000"/>
-            <a:headEnd/>
-            <a:tailEnd/>
-          </a:ln>
-          <a:effectLst/>
-        </p:spPr>
-      </p:pic>
-      <p:pic>
-        <p:nvPicPr>
-          <p:cNvPr id="550916" name="Picture 4"/>
-          <p:cNvPicPr>
-            <a:picLocks noChangeAspect="1" noChangeArrowheads="1"/>
-          </p:cNvPicPr>
-          <p:nvPr/>
-        </p:nvPicPr>
-        <p:blipFill>
-          <a:blip r:embed="rId3" cstate="print"/>
-          <a:srcRect/>
-          <a:stretch>
-            <a:fillRect/>
-          </a:stretch>
-        </p:blipFill>
-        <p:spPr bwMode="auto">
-          <a:xfrm>
-            <a:off x="1676400" y="3127376"/>
-            <a:ext cx="7162800" cy="3730625"/>
-          </a:xfrm>
-          <a:prstGeom prst="rect">
-            <a:avLst/>
-          </a:prstGeom>
-          <a:noFill/>
-          <a:ln w="57150">
-            <a:solidFill>
-              <a:schemeClr val="folHlink"/>
-            </a:solidFill>
-            <a:miter lim="800000"/>
-            <a:headEnd/>
-            <a:tailEnd/>
-          </a:ln>
-          <a:effectLst/>
-        </p:spPr>
-      </p:pic>
-    </p:spTree>
-    <p:extLst>
-      <p:ext uri="{BB962C8B-B14F-4D97-AF65-F5344CB8AC3E}">
-        <p14:creationId xmlns:p14="http://schemas.microsoft.com/office/powerpoint/2010/main" val="830490250"/>
-      </p:ext>
-    </p:extLst>
-  </p:cSld>
-  <p:clrMapOvr>
-    <a:masterClrMapping/>
-  </p:clrMapOvr>
-  <p:transition/>
-  <p:timing>
-    <p:tnLst>
-      <p:par>
-        <p:cTn id="1" dur="indefinite" restart="never" nodeType="tmRoot">
-          <p:childTnLst>
-            <p:seq concurrent="1" nextAc="seek">
-              <p:cTn id="2" dur="indefinite" nodeType="mainSeq">
-                <p:childTnLst>
-                  <p:par>
-                    <p:cTn id="3" fill="hold">
-                      <p:stCondLst>
-                        <p:cond delay="indefinite"/>
-                      </p:stCondLst>
-                      <p:childTnLst>
-                        <p:par>
-                          <p:cTn id="4" fill="hold">
-                            <p:stCondLst>
-                              <p:cond delay="0"/>
-                            </p:stCondLst>
-                            <p:childTnLst>
-                              <p:par>
-                                <p:cTn id="5" presetID="1" presetClass="entr" presetSubtype="0" fill="hold" nodeType="clickEffect">
-                                  <p:stCondLst>
-                                    <p:cond delay="0"/>
-                                  </p:stCondLst>
-                                  <p:childTnLst>
-                                    <p:set>
-                                      <p:cBhvr>
-                                        <p:cTn id="6" dur="1" fill="hold">
-                                          <p:stCondLst>
-                                            <p:cond delay="0"/>
-                                          </p:stCondLst>
-                                        </p:cTn>
-                                        <p:tgtEl>
-                                          <p:spTgt spid="550916"/>
-                                        </p:tgtEl>
-                                        <p:attrNameLst>
-                                          <p:attrName>style.visibility</p:attrName>
-                                        </p:attrNameLst>
-                                      </p:cBhvr>
-                                      <p:to>
-                                        <p:strVal val="visible"/>
-                                      </p:to>
-                                    </p:set>
-                                  </p:childTnLst>
-                                </p:cTn>
-                              </p:par>
-                            </p:childTnLst>
-                          </p:cTn>
-                        </p:par>
-                      </p:childTnLst>
-                    </p:cTn>
-                  </p:par>
-                </p:childTnLst>
-              </p:cTn>
-              <p:prevCondLst>
-                <p:cond evt="onPrev" delay="0">
-                  <p:tgtEl>
-                    <p:sldTgt/>
-                  </p:tgtEl>
-                </p:cond>
-              </p:prevCondLst>
-              <p:nextCondLst>
-                <p:cond evt="onNext" delay="0">
-                  <p:tgtEl>
-                    <p:sldTgt/>
-                  </p:tgtEl>
-                </p:cond>
-              </p:nextCondLst>
-            </p:seq>
-          </p:childTnLst>
-        </p:cTn>
-      </p:par>
-    </p:tnLst>
-  </p:timing>
 </p:sld>
 </file>
 

</xml_diff>

<commit_message>
new activity, no more lexical address
</commit_message>
<xml_diff>
--- a/ClassMaterials/OccursBound/12-OccursBound-LexAddr-reverse.pptx
+++ b/ClassMaterials/OccursBound/12-OccursBound-LexAddr-reverse.pptx
@@ -5,10 +5,10 @@
     <p:sldMasterId id="2147483781" r:id="rId1"/>
   </p:sldMasterIdLst>
   <p:notesMasterIdLst>
-    <p:notesMasterId r:id="rId18"/>
+    <p:notesMasterId r:id="rId12"/>
   </p:notesMasterIdLst>
   <p:handoutMasterIdLst>
-    <p:handoutMasterId r:id="rId19"/>
+    <p:handoutMasterId r:id="rId13"/>
   </p:handoutMasterIdLst>
   <p:sldIdLst>
     <p:sldId id="394" r:id="rId2"/>
@@ -20,13 +20,7 @@
     <p:sldId id="387" r:id="rId8"/>
     <p:sldId id="389" r:id="rId9"/>
     <p:sldId id="390" r:id="rId10"/>
-    <p:sldId id="413" r:id="rId11"/>
-    <p:sldId id="400" r:id="rId12"/>
-    <p:sldId id="401" r:id="rId13"/>
-    <p:sldId id="402" r:id="rId14"/>
-    <p:sldId id="403" r:id="rId15"/>
-    <p:sldId id="430" r:id="rId16"/>
-    <p:sldId id="415" r:id="rId17"/>
+    <p:sldId id="395" r:id="rId11"/>
   </p:sldIdLst>
   <p:sldSz cx="12192000" cy="6858000"/>
   <p:notesSz cx="7315200" cy="9601200"/>
@@ -916,91 +910,6 @@
 </p:notes>
 </file>
 
-<file path=ppt/notesSlides/notesSlide10.xml><?xml version="1.0" encoding="utf-8"?>
-<p:notes xmlns:a="http://schemas.openxmlformats.org/drawingml/2006/main" xmlns:r="http://schemas.openxmlformats.org/officeDocument/2006/relationships" xmlns:p="http://schemas.openxmlformats.org/presentationml/2006/main">
-  <p:cSld>
-    <p:spTree>
-      <p:nvGrpSpPr>
-        <p:cNvPr id="1" name=""/>
-        <p:cNvGrpSpPr/>
-        <p:nvPr/>
-      </p:nvGrpSpPr>
-      <p:grpSpPr>
-        <a:xfrm>
-          <a:off x="0" y="0"/>
-          <a:ext cx="0" cy="0"/>
-          <a:chOff x="0" y="0"/>
-          <a:chExt cx="0" cy="0"/>
-        </a:xfrm>
-      </p:grpSpPr>
-      <p:sp>
-        <p:nvSpPr>
-          <p:cNvPr id="2" name="Slide Image Placeholder 1"/>
-          <p:cNvSpPr>
-            <a:spLocks noGrp="1" noRot="1" noChangeAspect="1"/>
-          </p:cNvSpPr>
-          <p:nvPr>
-            <p:ph type="sldImg"/>
-          </p:nvPr>
-        </p:nvSpPr>
-        <p:spPr/>
-      </p:sp>
-      <p:sp>
-        <p:nvSpPr>
-          <p:cNvPr id="3" name="Notes Placeholder 2"/>
-          <p:cNvSpPr>
-            <a:spLocks noGrp="1"/>
-          </p:cNvSpPr>
-          <p:nvPr>
-            <p:ph type="body" idx="1"/>
-          </p:nvPr>
-        </p:nvSpPr>
-        <p:spPr/>
-        <p:txBody>
-          <a:bodyPr/>
-          <a:lstStyle/>
-          <a:p>
-            <a:endParaRPr lang="en-US" dirty="0"/>
-          </a:p>
-        </p:txBody>
-      </p:sp>
-      <p:sp>
-        <p:nvSpPr>
-          <p:cNvPr id="4" name="Slide Number Placeholder 3"/>
-          <p:cNvSpPr>
-            <a:spLocks noGrp="1"/>
-          </p:cNvSpPr>
-          <p:nvPr>
-            <p:ph type="sldNum" sz="quarter" idx="10"/>
-          </p:nvPr>
-        </p:nvSpPr>
-        <p:spPr/>
-        <p:txBody>
-          <a:bodyPr/>
-          <a:lstStyle/>
-          <a:p>
-            <a:fld id="{957F737C-2939-4B3C-A229-35593C5DE391}" type="slidenum">
-              <a:rPr lang="en-US" smtClean="0"/>
-              <a:pPr/>
-              <a:t>16</a:t>
-            </a:fld>
-            <a:endParaRPr lang="en-US"/>
-          </a:p>
-        </p:txBody>
-      </p:sp>
-    </p:spTree>
-    <p:extLst>
-      <p:ext uri="{BB962C8B-B14F-4D97-AF65-F5344CB8AC3E}">
-        <p14:creationId xmlns:p14="http://schemas.microsoft.com/office/powerpoint/2010/main" val="310700449"/>
-      </p:ext>
-    </p:extLst>
-  </p:cSld>
-  <p:clrMapOvr>
-    <a:masterClrMapping/>
-  </p:clrMapOvr>
-</p:notes>
-</file>
-
 <file path=ppt/notesSlides/notesSlide2.xml><?xml version="1.0" encoding="utf-8"?>
 <p:notes xmlns:a="http://schemas.openxmlformats.org/drawingml/2006/main" xmlns:r="http://schemas.openxmlformats.org/officeDocument/2006/relationships" xmlns:p="http://schemas.openxmlformats.org/presentationml/2006/main">
   <p:cSld>
@@ -1832,261 +1741,6 @@
     <p:extLst>
       <p:ext uri="{BB962C8B-B14F-4D97-AF65-F5344CB8AC3E}">
         <p14:creationId xmlns:p14="http://schemas.microsoft.com/office/powerpoint/2010/main" val="3787003063"/>
-      </p:ext>
-    </p:extLst>
-  </p:cSld>
-  <p:clrMapOvr>
-    <a:masterClrMapping/>
-  </p:clrMapOvr>
-</p:notes>
-</file>
-
-<file path=ppt/notesSlides/notesSlide7.xml><?xml version="1.0" encoding="utf-8"?>
-<p:notes xmlns:a="http://schemas.openxmlformats.org/drawingml/2006/main" xmlns:r="http://schemas.openxmlformats.org/officeDocument/2006/relationships" xmlns:p="http://schemas.openxmlformats.org/presentationml/2006/main">
-  <p:cSld>
-    <p:spTree>
-      <p:nvGrpSpPr>
-        <p:cNvPr id="1" name=""/>
-        <p:cNvGrpSpPr/>
-        <p:nvPr/>
-      </p:nvGrpSpPr>
-      <p:grpSpPr>
-        <a:xfrm>
-          <a:off x="0" y="0"/>
-          <a:ext cx="0" cy="0"/>
-          <a:chOff x="0" y="0"/>
-          <a:chExt cx="0" cy="0"/>
-        </a:xfrm>
-      </p:grpSpPr>
-      <p:sp>
-        <p:nvSpPr>
-          <p:cNvPr id="2" name="Slide Image Placeholder 1"/>
-          <p:cNvSpPr>
-            <a:spLocks noGrp="1" noRot="1" noChangeAspect="1"/>
-          </p:cNvSpPr>
-          <p:nvPr>
-            <p:ph type="sldImg"/>
-          </p:nvPr>
-        </p:nvSpPr>
-        <p:spPr/>
-      </p:sp>
-      <p:sp>
-        <p:nvSpPr>
-          <p:cNvPr id="3" name="Notes Placeholder 2"/>
-          <p:cNvSpPr>
-            <a:spLocks noGrp="1"/>
-          </p:cNvSpPr>
-          <p:nvPr>
-            <p:ph type="body" idx="1"/>
-          </p:nvPr>
-        </p:nvSpPr>
-        <p:spPr/>
-        <p:txBody>
-          <a:bodyPr/>
-          <a:lstStyle/>
-          <a:p>
-            <a:endParaRPr lang="en-US" dirty="0"/>
-          </a:p>
-        </p:txBody>
-      </p:sp>
-      <p:sp>
-        <p:nvSpPr>
-          <p:cNvPr id="4" name="Slide Number Placeholder 3"/>
-          <p:cNvSpPr>
-            <a:spLocks noGrp="1"/>
-          </p:cNvSpPr>
-          <p:nvPr>
-            <p:ph type="sldNum" sz="quarter" idx="5"/>
-          </p:nvPr>
-        </p:nvSpPr>
-        <p:spPr/>
-        <p:txBody>
-          <a:bodyPr/>
-          <a:lstStyle/>
-          <a:p>
-            <a:fld id="{957F737C-2939-4B3C-A229-35593C5DE391}" type="slidenum">
-              <a:rPr lang="en-US" smtClean="0"/>
-              <a:pPr/>
-              <a:t>10</a:t>
-            </a:fld>
-            <a:endParaRPr lang="en-US"/>
-          </a:p>
-        </p:txBody>
-      </p:sp>
-    </p:spTree>
-    <p:extLst>
-      <p:ext uri="{BB962C8B-B14F-4D97-AF65-F5344CB8AC3E}">
-        <p14:creationId xmlns:p14="http://schemas.microsoft.com/office/powerpoint/2010/main" val="2590771393"/>
-      </p:ext>
-    </p:extLst>
-  </p:cSld>
-  <p:clrMapOvr>
-    <a:masterClrMapping/>
-  </p:clrMapOvr>
-</p:notes>
-</file>
-
-<file path=ppt/notesSlides/notesSlide8.xml><?xml version="1.0" encoding="utf-8"?>
-<p:notes xmlns:a="http://schemas.openxmlformats.org/drawingml/2006/main" xmlns:r="http://schemas.openxmlformats.org/officeDocument/2006/relationships" xmlns:p="http://schemas.openxmlformats.org/presentationml/2006/main">
-  <p:cSld>
-    <p:spTree>
-      <p:nvGrpSpPr>
-        <p:cNvPr id="1" name=""/>
-        <p:cNvGrpSpPr/>
-        <p:nvPr/>
-      </p:nvGrpSpPr>
-      <p:grpSpPr>
-        <a:xfrm>
-          <a:off x="0" y="0"/>
-          <a:ext cx="0" cy="0"/>
-          <a:chOff x="0" y="0"/>
-          <a:chExt cx="0" cy="0"/>
-        </a:xfrm>
-      </p:grpSpPr>
-      <p:sp>
-        <p:nvSpPr>
-          <p:cNvPr id="2" name="Slide Image Placeholder 1"/>
-          <p:cNvSpPr>
-            <a:spLocks noGrp="1" noRot="1" noChangeAspect="1"/>
-          </p:cNvSpPr>
-          <p:nvPr>
-            <p:ph type="sldImg"/>
-          </p:nvPr>
-        </p:nvSpPr>
-        <p:spPr/>
-      </p:sp>
-      <p:sp>
-        <p:nvSpPr>
-          <p:cNvPr id="3" name="Notes Placeholder 2"/>
-          <p:cNvSpPr>
-            <a:spLocks noGrp="1"/>
-          </p:cNvSpPr>
-          <p:nvPr>
-            <p:ph type="body" idx="1"/>
-          </p:nvPr>
-        </p:nvSpPr>
-        <p:spPr/>
-        <p:txBody>
-          <a:bodyPr/>
-          <a:lstStyle/>
-          <a:p>
-            <a:endParaRPr lang="en-US" dirty="0"/>
-          </a:p>
-        </p:txBody>
-      </p:sp>
-      <p:sp>
-        <p:nvSpPr>
-          <p:cNvPr id="4" name="Slide Number Placeholder 3"/>
-          <p:cNvSpPr>
-            <a:spLocks noGrp="1"/>
-          </p:cNvSpPr>
-          <p:nvPr>
-            <p:ph type="sldNum" sz="quarter" idx="10"/>
-          </p:nvPr>
-        </p:nvSpPr>
-        <p:spPr/>
-        <p:txBody>
-          <a:bodyPr/>
-          <a:lstStyle/>
-          <a:p>
-            <a:fld id="{957F737C-2939-4B3C-A229-35593C5DE391}" type="slidenum">
-              <a:rPr lang="en-US" smtClean="0"/>
-              <a:pPr/>
-              <a:t>14</a:t>
-            </a:fld>
-            <a:endParaRPr lang="en-US"/>
-          </a:p>
-        </p:txBody>
-      </p:sp>
-    </p:spTree>
-    <p:extLst>
-      <p:ext uri="{BB962C8B-B14F-4D97-AF65-F5344CB8AC3E}">
-        <p14:creationId xmlns:p14="http://schemas.microsoft.com/office/powerpoint/2010/main" val="963005493"/>
-      </p:ext>
-    </p:extLst>
-  </p:cSld>
-  <p:clrMapOvr>
-    <a:masterClrMapping/>
-  </p:clrMapOvr>
-</p:notes>
-</file>
-
-<file path=ppt/notesSlides/notesSlide9.xml><?xml version="1.0" encoding="utf-8"?>
-<p:notes xmlns:a="http://schemas.openxmlformats.org/drawingml/2006/main" xmlns:r="http://schemas.openxmlformats.org/officeDocument/2006/relationships" xmlns:p="http://schemas.openxmlformats.org/presentationml/2006/main">
-  <p:cSld>
-    <p:spTree>
-      <p:nvGrpSpPr>
-        <p:cNvPr id="1" name=""/>
-        <p:cNvGrpSpPr/>
-        <p:nvPr/>
-      </p:nvGrpSpPr>
-      <p:grpSpPr>
-        <a:xfrm>
-          <a:off x="0" y="0"/>
-          <a:ext cx="0" cy="0"/>
-          <a:chOff x="0" y="0"/>
-          <a:chExt cx="0" cy="0"/>
-        </a:xfrm>
-      </p:grpSpPr>
-      <p:sp>
-        <p:nvSpPr>
-          <p:cNvPr id="2" name="Slide Image Placeholder 1"/>
-          <p:cNvSpPr>
-            <a:spLocks noGrp="1" noRot="1" noChangeAspect="1"/>
-          </p:cNvSpPr>
-          <p:nvPr>
-            <p:ph type="sldImg"/>
-          </p:nvPr>
-        </p:nvSpPr>
-        <p:spPr/>
-      </p:sp>
-      <p:sp>
-        <p:nvSpPr>
-          <p:cNvPr id="3" name="Notes Placeholder 2"/>
-          <p:cNvSpPr>
-            <a:spLocks noGrp="1"/>
-          </p:cNvSpPr>
-          <p:nvPr>
-            <p:ph type="body" idx="1"/>
-          </p:nvPr>
-        </p:nvSpPr>
-        <p:spPr/>
-        <p:txBody>
-          <a:bodyPr/>
-          <a:lstStyle/>
-          <a:p>
-            <a:endParaRPr lang="en-US" dirty="0"/>
-          </a:p>
-        </p:txBody>
-      </p:sp>
-      <p:sp>
-        <p:nvSpPr>
-          <p:cNvPr id="4" name="Slide Number Placeholder 3"/>
-          <p:cNvSpPr>
-            <a:spLocks noGrp="1"/>
-          </p:cNvSpPr>
-          <p:nvPr>
-            <p:ph type="sldNum" sz="quarter" idx="10"/>
-          </p:nvPr>
-        </p:nvSpPr>
-        <p:spPr/>
-        <p:txBody>
-          <a:bodyPr/>
-          <a:lstStyle/>
-          <a:p>
-            <a:fld id="{957F737C-2939-4B3C-A229-35593C5DE391}" type="slidenum">
-              <a:rPr lang="en-US" smtClean="0"/>
-              <a:pPr/>
-              <a:t>15</a:t>
-            </a:fld>
-            <a:endParaRPr lang="en-US"/>
-          </a:p>
-        </p:txBody>
-      </p:sp>
-    </p:spTree>
-    <p:extLst>
-      <p:ext uri="{BB962C8B-B14F-4D97-AF65-F5344CB8AC3E}">
-        <p14:creationId xmlns:p14="http://schemas.microsoft.com/office/powerpoint/2010/main" val="431449991"/>
       </p:ext>
     </p:extLst>
   </p:cSld>
@@ -5543,15 +5197,6 @@
               <a:t>write occurs-bound?</a:t>
             </a:r>
           </a:p>
-          <a:p>
-            <a:r>
-              <a:rPr lang="en-US" dirty="0"/>
-              <a:t>Lexical address</a:t>
-            </a:r>
-          </a:p>
-          <a:p>
-            <a:endParaRPr lang="en-US" dirty="0"/>
-          </a:p>
         </p:txBody>
       </p:sp>
       <p:sp>
@@ -5756,9 +5401,15 @@
       </p:grpSpPr>
       <p:sp>
         <p:nvSpPr>
-          <p:cNvPr id="535554" name="Rectangle 2"/>
+          <p:cNvPr id="2" name="Title 1">
+            <a:extLst>
+              <a:ext uri="{FF2B5EF4-FFF2-40B4-BE49-F238E27FC236}">
+                <a16:creationId xmlns:a16="http://schemas.microsoft.com/office/drawing/2014/main" id="{31C2E33C-A77B-0CFA-E740-C2F2401A4FA6}"/>
+              </a:ext>
+            </a:extLst>
+          </p:cNvPr>
           <p:cNvSpPr>
-            <a:spLocks noGrp="1" noChangeArrowheads="1"/>
+            <a:spLocks noGrp="1"/>
           </p:cNvSpPr>
           <p:nvPr>
             <p:ph type="title"/>
@@ -5771,39 +5422,90 @@
           <a:p>
             <a:r>
               <a:rPr lang="en-US" dirty="0"/>
-              <a:t>lexical depth and lexical address</a:t>
-            </a:r>
-          </a:p>
-        </p:txBody>
-      </p:sp>
-      <p:sp>
-        <p:nvSpPr>
-          <p:cNvPr id="535555" name="Rectangle 3"/>
+              <a:t>Activity</a:t>
+            </a:r>
+          </a:p>
+        </p:txBody>
+      </p:sp>
+      <p:sp>
+        <p:nvSpPr>
+          <p:cNvPr id="3" name="Text Placeholder 2">
+            <a:extLst>
+              <a:ext uri="{FF2B5EF4-FFF2-40B4-BE49-F238E27FC236}">
+                <a16:creationId xmlns:a16="http://schemas.microsoft.com/office/drawing/2014/main" id="{0B4A1AA5-4342-C70D-037D-1BD81CC36443}"/>
+              </a:ext>
+            </a:extLst>
+          </p:cNvPr>
           <p:cNvSpPr>
-            <a:spLocks noGrp="1" noChangeArrowheads="1"/>
+            <a:spLocks noGrp="1"/>
           </p:cNvSpPr>
           <p:nvPr>
-            <p:ph type="body" idx="1"/>
+            <p:ph type="body" sz="half" idx="1"/>
           </p:nvPr>
         </p:nvSpPr>
-        <p:spPr/>
+        <p:spPr>
+          <a:xfrm>
+            <a:off x="914400" y="2514600"/>
+            <a:ext cx="10591800" cy="3581400"/>
+          </a:xfrm>
+        </p:spPr>
         <p:txBody>
           <a:bodyPr/>
           <a:lstStyle/>
           <a:p>
-            <a:r>
-              <a:rPr lang="en-US" sz="3600" b="1" dirty="0">
-                <a:solidFill>
-                  <a:srgbClr val="FFFF00"/>
-                </a:solidFill>
-              </a:rPr>
-              <a:t>What are they?</a:t>
-            </a:r>
-          </a:p>
-          <a:p>
-            <a:r>
-              <a:rPr lang="en-US" sz="3600" dirty="0"/>
-              <a:t>What are they good for?</a:t>
+            <a:pPr marL="0" indent="0">
+              <a:buNone/>
+            </a:pPr>
+            <a:r>
+              <a:rPr lang="en-US" dirty="0"/>
+              <a:t>In pairs </a:t>
+            </a:r>
+          </a:p>
+          <a:p>
+            <a:pPr marL="0" indent="0">
+              <a:buNone/>
+            </a:pPr>
+            <a:r>
+              <a:rPr lang="en-US" b="1" dirty="0"/>
+              <a:t>Step 1: Write occurs-free</a:t>
+            </a:r>
+          </a:p>
+          <a:p>
+            <a:pPr marL="0" indent="0">
+              <a:buNone/>
+            </a:pPr>
+            <a:r>
+              <a:rPr lang="en-US" dirty="0"/>
+              <a:t>Key idea: in a lambda expression:</a:t>
+            </a:r>
+          </a:p>
+          <a:p>
+            <a:pPr marL="0" indent="0">
+              <a:buNone/>
+            </a:pPr>
+            <a:r>
+              <a:rPr lang="en-US" dirty="0">
+                <a:latin typeface="Consolas" panose="020B0609020204030204" pitchFamily="49" charset="0"/>
+              </a:rPr>
+              <a:t>(lambda (q) ???)</a:t>
+            </a:r>
+          </a:p>
+          <a:p>
+            <a:pPr marL="0" indent="0">
+              <a:buNone/>
+            </a:pPr>
+            <a:r>
+              <a:rPr lang="en-US" dirty="0"/>
+              <a:t>q can never be free in ???</a:t>
+            </a:r>
+          </a:p>
+          <a:p>
+            <a:pPr marL="0" indent="0">
+              <a:buNone/>
+            </a:pPr>
+            <a:r>
+              <a:rPr lang="en-US" b="1" dirty="0"/>
+              <a:t>Step 2: Write all-free</a:t>
             </a:r>
           </a:p>
         </p:txBody>
@@ -5811,2631 +5513,7 @@
     </p:spTree>
     <p:extLst>
       <p:ext uri="{BB962C8B-B14F-4D97-AF65-F5344CB8AC3E}">
-        <p14:creationId xmlns:p14="http://schemas.microsoft.com/office/powerpoint/2010/main" val="1275946938"/>
-      </p:ext>
-    </p:extLst>
-  </p:cSld>
-  <p:clrMapOvr>
-    <a:masterClrMapping/>
-  </p:clrMapOvr>
-</p:sld>
-</file>
-
-<file path=ppt/slides/slide11.xml><?xml version="1.0" encoding="utf-8"?>
-<p:sld xmlns:a="http://schemas.openxmlformats.org/drawingml/2006/main" xmlns:r="http://schemas.openxmlformats.org/officeDocument/2006/relationships" xmlns:p="http://schemas.openxmlformats.org/presentationml/2006/main">
-  <p:cSld>
-    <p:spTree>
-      <p:nvGrpSpPr>
-        <p:cNvPr id="1" name=""/>
-        <p:cNvGrpSpPr/>
-        <p:nvPr/>
-      </p:nvGrpSpPr>
-      <p:grpSpPr>
-        <a:xfrm>
-          <a:off x="0" y="0"/>
-          <a:ext cx="0" cy="0"/>
-          <a:chOff x="0" y="0"/>
-          <a:chExt cx="0" cy="0"/>
-        </a:xfrm>
-      </p:grpSpPr>
-      <p:sp>
-        <p:nvSpPr>
-          <p:cNvPr id="536578" name="Rectangle 2"/>
-          <p:cNvSpPr>
-            <a:spLocks noGrp="1" noChangeArrowheads="1"/>
-          </p:cNvSpPr>
-          <p:nvPr>
-            <p:ph type="title"/>
-          </p:nvPr>
-        </p:nvSpPr>
-        <p:spPr>
-          <a:xfrm>
-            <a:off x="2209800" y="-152400"/>
-            <a:ext cx="7772400" cy="1066800"/>
-          </a:xfrm>
-        </p:spPr>
-        <p:txBody>
-          <a:bodyPr/>
-          <a:lstStyle/>
-          <a:p>
-            <a:r>
-              <a:rPr lang="en-US" sz="4000" dirty="0"/>
-              <a:t>lexical depth and lexical address</a:t>
-            </a:r>
-          </a:p>
-        </p:txBody>
-      </p:sp>
-      <p:sp>
-        <p:nvSpPr>
-          <p:cNvPr id="536579" name="Rectangle 3"/>
-          <p:cNvSpPr>
-            <a:spLocks noGrp="1" noChangeArrowheads="1"/>
-          </p:cNvSpPr>
-          <p:nvPr>
-            <p:ph type="body" idx="1"/>
-          </p:nvPr>
-        </p:nvSpPr>
-        <p:spPr>
-          <a:xfrm>
-            <a:off x="457200" y="1143000"/>
-            <a:ext cx="11201400" cy="5105400"/>
-          </a:xfrm>
-        </p:spPr>
-        <p:txBody>
-          <a:bodyPr/>
-          <a:lstStyle/>
-          <a:p>
-            <a:r>
-              <a:rPr lang="en-US" sz="2800" dirty="0"/>
-              <a:t>The </a:t>
-            </a:r>
-            <a:r>
-              <a:rPr lang="en-US" sz="2800" b="1" dirty="0">
-                <a:solidFill>
-                  <a:srgbClr val="FFFF00"/>
-                </a:solidFill>
-              </a:rPr>
-              <a:t>lexical depth</a:t>
-            </a:r>
-            <a:r>
-              <a:rPr lang="en-US" sz="2800" dirty="0">
-                <a:solidFill>
-                  <a:srgbClr val="FFFF00"/>
-                </a:solidFill>
-              </a:rPr>
-              <a:t> of a bound variable </a:t>
-            </a:r>
-            <a:r>
-              <a:rPr lang="en-US" sz="2800" i="1" dirty="0">
-                <a:solidFill>
-                  <a:srgbClr val="FFFF00"/>
-                </a:solidFill>
-              </a:rPr>
-              <a:t>occurrence</a:t>
-            </a:r>
-            <a:r>
-              <a:rPr lang="en-US" sz="2800" dirty="0">
-                <a:solidFill>
-                  <a:srgbClr val="FFFF00"/>
-                </a:solidFill>
-              </a:rPr>
-              <a:t> </a:t>
-            </a:r>
-            <a:r>
-              <a:rPr lang="en-US" sz="2800" dirty="0"/>
-              <a:t>is the number of levels of nested declarations between it and its declaration.</a:t>
-            </a:r>
-          </a:p>
-          <a:p>
-            <a:pPr lvl="1"/>
-            <a:r>
-              <a:rPr lang="en-US" sz="2400" dirty="0"/>
-              <a:t>In </a:t>
-            </a:r>
-            <a:r>
-              <a:rPr lang="en-US" sz="2400" b="1" dirty="0">
-                <a:solidFill>
-                  <a:srgbClr val="FFFF00"/>
-                </a:solidFill>
-                <a:latin typeface="Courier New" pitchFamily="49" charset="0"/>
-              </a:rPr>
-              <a:t>(lambda (z) </a:t>
-            </a:r>
-            <a:br>
-              <a:rPr lang="en-US" sz="2400" b="1" dirty="0">
-                <a:solidFill>
-                  <a:srgbClr val="FFFF00"/>
-                </a:solidFill>
-                <a:latin typeface="Courier New" pitchFamily="49" charset="0"/>
-              </a:rPr>
-            </a:br>
-            <a:r>
-              <a:rPr lang="en-US" sz="2400" b="1" dirty="0">
-                <a:solidFill>
-                  <a:srgbClr val="FFFF00"/>
-                </a:solidFill>
-                <a:latin typeface="Courier New" pitchFamily="49" charset="0"/>
-              </a:rPr>
-              <a:t>    (lambda (x) </a:t>
-            </a:r>
-            <a:br>
-              <a:rPr lang="en-US" sz="2400" b="1" dirty="0">
-                <a:solidFill>
-                  <a:srgbClr val="FFFF00"/>
-                </a:solidFill>
-                <a:latin typeface="Courier New" pitchFamily="49" charset="0"/>
-              </a:rPr>
-            </a:br>
-            <a:r>
-              <a:rPr lang="en-US" sz="2400" b="1" dirty="0">
-                <a:solidFill>
-                  <a:srgbClr val="FFFF00"/>
-                </a:solidFill>
-                <a:latin typeface="Courier New" pitchFamily="49" charset="0"/>
-              </a:rPr>
-              <a:t>      (lambda (y) (x y))))</a:t>
-            </a:r>
-            <a:r>
-              <a:rPr lang="en-US" sz="2400" dirty="0">
-                <a:solidFill>
-                  <a:srgbClr val="FFFF00"/>
-                </a:solidFill>
-              </a:rPr>
-              <a:t> </a:t>
-            </a:r>
-          </a:p>
-          <a:p>
-            <a:pPr lvl="2"/>
-            <a:r>
-              <a:rPr lang="en-US" sz="2000" dirty="0"/>
-              <a:t>the occurrence of y has depth 0 </a:t>
-            </a:r>
-          </a:p>
-          <a:p>
-            <a:pPr lvl="2"/>
-            <a:r>
-              <a:rPr lang="en-US" sz="2000" dirty="0"/>
-              <a:t>the occurrence of x has depth 1.   </a:t>
-            </a:r>
-          </a:p>
-          <a:p>
-            <a:pPr lvl="2"/>
-            <a:r>
-              <a:rPr lang="en-US" sz="2000" dirty="0"/>
-              <a:t>There are no occurrences of z. </a:t>
-            </a:r>
-          </a:p>
-          <a:p>
-            <a:r>
-              <a:rPr lang="en-US" sz="2800" dirty="0"/>
-              <a:t>This can used by the Scheme run-time system to make looking up a local variable's value be faster.  </a:t>
-            </a:r>
-          </a:p>
-          <a:p>
-            <a:r>
-              <a:rPr lang="en-US" sz="2800" dirty="0"/>
-              <a:t>More on that later.</a:t>
-            </a:r>
-          </a:p>
-        </p:txBody>
-      </p:sp>
-    </p:spTree>
-    <p:extLst>
-      <p:ext uri="{BB962C8B-B14F-4D97-AF65-F5344CB8AC3E}">
-        <p14:creationId xmlns:p14="http://schemas.microsoft.com/office/powerpoint/2010/main" val="2319282995"/>
-      </p:ext>
-    </p:extLst>
-  </p:cSld>
-  <p:clrMapOvr>
-    <a:masterClrMapping/>
-  </p:clrMapOvr>
-  <p:timing>
-    <p:tnLst>
-      <p:par>
-        <p:cTn id="1" dur="indefinite" restart="never" nodeType="tmRoot">
-          <p:childTnLst>
-            <p:seq concurrent="1" nextAc="seek">
-              <p:cTn id="2" dur="indefinite" nodeType="mainSeq">
-                <p:childTnLst>
-                  <p:par>
-                    <p:cTn id="3" fill="hold">
-                      <p:stCondLst>
-                        <p:cond delay="indefinite"/>
-                      </p:stCondLst>
-                      <p:childTnLst>
-                        <p:par>
-                          <p:cTn id="4" fill="hold">
-                            <p:stCondLst>
-                              <p:cond delay="0"/>
-                            </p:stCondLst>
-                            <p:childTnLst>
-                              <p:par>
-                                <p:cTn id="5" presetID="1" presetClass="entr" presetSubtype="0" fill="hold" nodeType="clickEffect">
-                                  <p:stCondLst>
-                                    <p:cond delay="0"/>
-                                  </p:stCondLst>
-                                  <p:childTnLst>
-                                    <p:set>
-                                      <p:cBhvr>
-                                        <p:cTn id="6" dur="1" fill="hold">
-                                          <p:stCondLst>
-                                            <p:cond delay="0"/>
-                                          </p:stCondLst>
-                                        </p:cTn>
-                                        <p:tgtEl>
-                                          <p:spTgt spid="536579">
-                                            <p:txEl>
-                                              <p:pRg st="1" end="1"/>
-                                            </p:txEl>
-                                          </p:spTgt>
-                                        </p:tgtEl>
-                                        <p:attrNameLst>
-                                          <p:attrName>style.visibility</p:attrName>
-                                        </p:attrNameLst>
-                                      </p:cBhvr>
-                                      <p:to>
-                                        <p:strVal val="visible"/>
-                                      </p:to>
-                                    </p:set>
-                                  </p:childTnLst>
-                                </p:cTn>
-                              </p:par>
-                              <p:par>
-                                <p:cTn id="7" presetID="1" presetClass="entr" presetSubtype="0" fill="hold" nodeType="withEffect">
-                                  <p:stCondLst>
-                                    <p:cond delay="0"/>
-                                  </p:stCondLst>
-                                  <p:childTnLst>
-                                    <p:set>
-                                      <p:cBhvr>
-                                        <p:cTn id="8" dur="1" fill="hold">
-                                          <p:stCondLst>
-                                            <p:cond delay="0"/>
-                                          </p:stCondLst>
-                                        </p:cTn>
-                                        <p:tgtEl>
-                                          <p:spTgt spid="536579">
-                                            <p:txEl>
-                                              <p:pRg st="2" end="2"/>
-                                            </p:txEl>
-                                          </p:spTgt>
-                                        </p:tgtEl>
-                                        <p:attrNameLst>
-                                          <p:attrName>style.visibility</p:attrName>
-                                        </p:attrNameLst>
-                                      </p:cBhvr>
-                                      <p:to>
-                                        <p:strVal val="visible"/>
-                                      </p:to>
-                                    </p:set>
-                                  </p:childTnLst>
-                                </p:cTn>
-                              </p:par>
-                              <p:par>
-                                <p:cTn id="9" presetID="1" presetClass="entr" presetSubtype="0" fill="hold" nodeType="withEffect">
-                                  <p:stCondLst>
-                                    <p:cond delay="0"/>
-                                  </p:stCondLst>
-                                  <p:childTnLst>
-                                    <p:set>
-                                      <p:cBhvr>
-                                        <p:cTn id="10" dur="1" fill="hold">
-                                          <p:stCondLst>
-                                            <p:cond delay="0"/>
-                                          </p:stCondLst>
-                                        </p:cTn>
-                                        <p:tgtEl>
-                                          <p:spTgt spid="536579">
-                                            <p:txEl>
-                                              <p:pRg st="3" end="3"/>
-                                            </p:txEl>
-                                          </p:spTgt>
-                                        </p:tgtEl>
-                                        <p:attrNameLst>
-                                          <p:attrName>style.visibility</p:attrName>
-                                        </p:attrNameLst>
-                                      </p:cBhvr>
-                                      <p:to>
-                                        <p:strVal val="visible"/>
-                                      </p:to>
-                                    </p:set>
-                                  </p:childTnLst>
-                                </p:cTn>
-                              </p:par>
-                              <p:par>
-                                <p:cTn id="11" presetID="1" presetClass="entr" presetSubtype="0" fill="hold" nodeType="withEffect">
-                                  <p:stCondLst>
-                                    <p:cond delay="0"/>
-                                  </p:stCondLst>
-                                  <p:childTnLst>
-                                    <p:set>
-                                      <p:cBhvr>
-                                        <p:cTn id="12" dur="1" fill="hold">
-                                          <p:stCondLst>
-                                            <p:cond delay="0"/>
-                                          </p:stCondLst>
-                                        </p:cTn>
-                                        <p:tgtEl>
-                                          <p:spTgt spid="536579">
-                                            <p:txEl>
-                                              <p:pRg st="4" end="4"/>
-                                            </p:txEl>
-                                          </p:spTgt>
-                                        </p:tgtEl>
-                                        <p:attrNameLst>
-                                          <p:attrName>style.visibility</p:attrName>
-                                        </p:attrNameLst>
-                                      </p:cBhvr>
-                                      <p:to>
-                                        <p:strVal val="visible"/>
-                                      </p:to>
-                                    </p:set>
-                                  </p:childTnLst>
-                                </p:cTn>
-                              </p:par>
-                            </p:childTnLst>
-                          </p:cTn>
-                        </p:par>
-                      </p:childTnLst>
-                    </p:cTn>
-                  </p:par>
-                  <p:par>
-                    <p:cTn id="13" fill="hold">
-                      <p:stCondLst>
-                        <p:cond delay="indefinite"/>
-                      </p:stCondLst>
-                      <p:childTnLst>
-                        <p:par>
-                          <p:cTn id="14" fill="hold">
-                            <p:stCondLst>
-                              <p:cond delay="0"/>
-                            </p:stCondLst>
-                            <p:childTnLst>
-                              <p:par>
-                                <p:cTn id="15" presetID="1" presetClass="entr" presetSubtype="0" fill="hold" nodeType="clickEffect">
-                                  <p:stCondLst>
-                                    <p:cond delay="0"/>
-                                  </p:stCondLst>
-                                  <p:childTnLst>
-                                    <p:set>
-                                      <p:cBhvr>
-                                        <p:cTn id="16" dur="1" fill="hold">
-                                          <p:stCondLst>
-                                            <p:cond delay="0"/>
-                                          </p:stCondLst>
-                                        </p:cTn>
-                                        <p:tgtEl>
-                                          <p:spTgt spid="536579">
-                                            <p:txEl>
-                                              <p:pRg st="5" end="5"/>
-                                            </p:txEl>
-                                          </p:spTgt>
-                                        </p:tgtEl>
-                                        <p:attrNameLst>
-                                          <p:attrName>style.visibility</p:attrName>
-                                        </p:attrNameLst>
-                                      </p:cBhvr>
-                                      <p:to>
-                                        <p:strVal val="visible"/>
-                                      </p:to>
-                                    </p:set>
-                                  </p:childTnLst>
-                                </p:cTn>
-                              </p:par>
-                              <p:par>
-                                <p:cTn id="17" presetID="1" presetClass="entr" presetSubtype="0" fill="hold" nodeType="withEffect">
-                                  <p:stCondLst>
-                                    <p:cond delay="0"/>
-                                  </p:stCondLst>
-                                  <p:childTnLst>
-                                    <p:set>
-                                      <p:cBhvr>
-                                        <p:cTn id="18" dur="1" fill="hold">
-                                          <p:stCondLst>
-                                            <p:cond delay="0"/>
-                                          </p:stCondLst>
-                                        </p:cTn>
-                                        <p:tgtEl>
-                                          <p:spTgt spid="536579">
-                                            <p:txEl>
-                                              <p:pRg st="6" end="6"/>
-                                            </p:txEl>
-                                          </p:spTgt>
-                                        </p:tgtEl>
-                                        <p:attrNameLst>
-                                          <p:attrName>style.visibility</p:attrName>
-                                        </p:attrNameLst>
-                                      </p:cBhvr>
-                                      <p:to>
-                                        <p:strVal val="visible"/>
-                                      </p:to>
-                                    </p:set>
-                                  </p:childTnLst>
-                                </p:cTn>
-                              </p:par>
-                            </p:childTnLst>
-                          </p:cTn>
-                        </p:par>
-                      </p:childTnLst>
-                    </p:cTn>
-                  </p:par>
-                </p:childTnLst>
-              </p:cTn>
-              <p:prevCondLst>
-                <p:cond evt="onPrev" delay="0">
-                  <p:tgtEl>
-                    <p:sldTgt/>
-                  </p:tgtEl>
-                </p:cond>
-              </p:prevCondLst>
-              <p:nextCondLst>
-                <p:cond evt="onNext" delay="0">
-                  <p:tgtEl>
-                    <p:sldTgt/>
-                  </p:tgtEl>
-                </p:cond>
-              </p:nextCondLst>
-            </p:seq>
-          </p:childTnLst>
-        </p:cTn>
-      </p:par>
-    </p:tnLst>
-  </p:timing>
-</p:sld>
-</file>
-
-<file path=ppt/slides/slide12.xml><?xml version="1.0" encoding="utf-8"?>
-<p:sld xmlns:a="http://schemas.openxmlformats.org/drawingml/2006/main" xmlns:r="http://schemas.openxmlformats.org/officeDocument/2006/relationships" xmlns:p="http://schemas.openxmlformats.org/presentationml/2006/main">
-  <p:cSld>
-    <p:spTree>
-      <p:nvGrpSpPr>
-        <p:cNvPr id="1" name=""/>
-        <p:cNvGrpSpPr/>
-        <p:nvPr/>
-      </p:nvGrpSpPr>
-      <p:grpSpPr>
-        <a:xfrm>
-          <a:off x="0" y="0"/>
-          <a:ext cx="0" cy="0"/>
-          <a:chOff x="0" y="0"/>
-          <a:chExt cx="0" cy="0"/>
-        </a:xfrm>
-      </p:grpSpPr>
-      <p:sp>
-        <p:nvSpPr>
-          <p:cNvPr id="537602" name="Rectangle 2"/>
-          <p:cNvSpPr>
-            <a:spLocks noGrp="1" noChangeArrowheads="1"/>
-          </p:cNvSpPr>
-          <p:nvPr>
-            <p:ph type="title"/>
-          </p:nvPr>
-        </p:nvSpPr>
-        <p:spPr>
-          <a:xfrm>
-            <a:off x="2209800" y="152400"/>
-            <a:ext cx="7772400" cy="1066800"/>
-          </a:xfrm>
-        </p:spPr>
-        <p:txBody>
-          <a:bodyPr/>
-          <a:lstStyle/>
-          <a:p>
-            <a:r>
-              <a:rPr lang="en-US" sz="4000" dirty="0"/>
-              <a:t>lexical depth and lexical address</a:t>
-            </a:r>
-          </a:p>
-        </p:txBody>
-      </p:sp>
-      <p:sp>
-        <p:nvSpPr>
-          <p:cNvPr id="537603" name="Rectangle 3"/>
-          <p:cNvSpPr>
-            <a:spLocks noGrp="1" noChangeArrowheads="1"/>
-          </p:cNvSpPr>
-          <p:nvPr>
-            <p:ph type="body" idx="1"/>
-          </p:nvPr>
-        </p:nvSpPr>
-        <p:spPr>
-          <a:xfrm>
-            <a:off x="1143000" y="1219200"/>
-            <a:ext cx="9144000" cy="5105400"/>
-          </a:xfrm>
-        </p:spPr>
-        <p:txBody>
-          <a:bodyPr/>
-          <a:lstStyle/>
-          <a:p>
-            <a:r>
-              <a:rPr lang="en-US" sz="2800" dirty="0"/>
-              <a:t>Besides lexical depth, the other part of a variable’s lexical address is its position within its declaration list.</a:t>
-            </a:r>
-          </a:p>
-          <a:p>
-            <a:r>
-              <a:rPr lang="en-US" sz="2800" dirty="0"/>
-              <a:t>In </a:t>
-            </a:r>
-            <a:r>
-              <a:rPr lang="en-US" sz="2400" b="1" dirty="0">
-                <a:solidFill>
-                  <a:srgbClr val="FFFF00"/>
-                </a:solidFill>
-                <a:latin typeface="Courier New" pitchFamily="49" charset="0"/>
-              </a:rPr>
-              <a:t>(lambda (x z) </a:t>
-            </a:r>
-            <a:br>
-              <a:rPr lang="en-US" sz="2400" b="1" dirty="0">
-                <a:solidFill>
-                  <a:srgbClr val="FFFF00"/>
-                </a:solidFill>
-                <a:latin typeface="Courier New" pitchFamily="49" charset="0"/>
-              </a:rPr>
-            </a:br>
-            <a:r>
-              <a:rPr lang="en-US" sz="2400" b="1" dirty="0">
-                <a:solidFill>
-                  <a:srgbClr val="FFFF00"/>
-                </a:solidFill>
-                <a:latin typeface="Courier New" pitchFamily="49" charset="0"/>
-              </a:rPr>
-              <a:t>    (lambda (y) </a:t>
-            </a:r>
-            <a:br>
-              <a:rPr lang="en-US" sz="2400" b="1" dirty="0">
-                <a:solidFill>
-                  <a:srgbClr val="FFFF00"/>
-                </a:solidFill>
-                <a:latin typeface="Courier New" pitchFamily="49" charset="0"/>
-              </a:rPr>
-            </a:br>
-            <a:r>
-              <a:rPr lang="en-US" sz="2400" b="1" dirty="0">
-                <a:solidFill>
-                  <a:srgbClr val="FFFF00"/>
-                </a:solidFill>
-                <a:latin typeface="Courier New" pitchFamily="49" charset="0"/>
-              </a:rPr>
-              <a:t>      ((x y) z)))</a:t>
-            </a:r>
-            <a:br>
-              <a:rPr lang="en-US" sz="2400" dirty="0">
-                <a:solidFill>
-                  <a:srgbClr val="FFFF00"/>
-                </a:solidFill>
-              </a:rPr>
-            </a:br>
-            <a:r>
-              <a:rPr lang="en-US" sz="2800" dirty="0"/>
-              <a:t>The occurrence of x has depth 1 and position 0.</a:t>
-            </a:r>
-            <a:br>
-              <a:rPr lang="en-US" sz="2800" dirty="0"/>
-            </a:br>
-            <a:r>
-              <a:rPr lang="en-US" sz="2800" dirty="0"/>
-              <a:t>The occurrence of y has depth 0 and position 0.</a:t>
-            </a:r>
-            <a:br>
-              <a:rPr lang="en-US" sz="2800" dirty="0"/>
-            </a:br>
-            <a:r>
-              <a:rPr lang="en-US" sz="2800" dirty="0"/>
-              <a:t>The occurrence of z has depth 1 and position 1.</a:t>
-            </a:r>
-          </a:p>
-          <a:p>
-            <a:endParaRPr lang="en-US" sz="2800" dirty="0"/>
-          </a:p>
-        </p:txBody>
-      </p:sp>
-    </p:spTree>
-    <p:extLst>
-      <p:ext uri="{BB962C8B-B14F-4D97-AF65-F5344CB8AC3E}">
-        <p14:creationId xmlns:p14="http://schemas.microsoft.com/office/powerpoint/2010/main" val="3904978057"/>
-      </p:ext>
-    </p:extLst>
-  </p:cSld>
-  <p:clrMapOvr>
-    <a:masterClrMapping/>
-  </p:clrMapOvr>
-</p:sld>
-</file>
-
-<file path=ppt/slides/slide13.xml><?xml version="1.0" encoding="utf-8"?>
-<p:sld xmlns:a="http://schemas.openxmlformats.org/drawingml/2006/main" xmlns:r="http://schemas.openxmlformats.org/officeDocument/2006/relationships" xmlns:p="http://schemas.openxmlformats.org/presentationml/2006/main">
-  <p:cSld>
-    <p:spTree>
-      <p:nvGrpSpPr>
-        <p:cNvPr id="1" name=""/>
-        <p:cNvGrpSpPr/>
-        <p:nvPr/>
-      </p:nvGrpSpPr>
-      <p:grpSpPr>
-        <a:xfrm>
-          <a:off x="0" y="0"/>
-          <a:ext cx="0" cy="0"/>
-          <a:chOff x="0" y="0"/>
-          <a:chExt cx="0" cy="0"/>
-        </a:xfrm>
-      </p:grpSpPr>
-      <p:sp>
-        <p:nvSpPr>
-          <p:cNvPr id="538626" name="Rectangle 2"/>
-          <p:cNvSpPr>
-            <a:spLocks noGrp="1" noChangeArrowheads="1"/>
-          </p:cNvSpPr>
-          <p:nvPr>
-            <p:ph type="title"/>
-          </p:nvPr>
-        </p:nvSpPr>
-        <p:spPr>
-          <a:xfrm>
-            <a:off x="2133600" y="228600"/>
-            <a:ext cx="8229600" cy="1143000"/>
-          </a:xfrm>
-        </p:spPr>
-        <p:txBody>
-          <a:bodyPr/>
-          <a:lstStyle/>
-          <a:p>
-            <a:r>
-              <a:rPr lang="en-US"/>
-              <a:t>lexical address example</a:t>
-            </a:r>
-          </a:p>
-        </p:txBody>
-      </p:sp>
-      <p:sp>
-        <p:nvSpPr>
-          <p:cNvPr id="538627" name="Rectangle 3"/>
-          <p:cNvSpPr>
-            <a:spLocks noGrp="1" noChangeArrowheads="1"/>
-          </p:cNvSpPr>
-          <p:nvPr>
-            <p:ph type="body" idx="1"/>
-          </p:nvPr>
-        </p:nvSpPr>
-        <p:spPr>
-          <a:xfrm>
-            <a:off x="2971800" y="1524000"/>
-            <a:ext cx="8610600" cy="5029200"/>
-          </a:xfrm>
-        </p:spPr>
-        <p:txBody>
-          <a:bodyPr/>
-          <a:lstStyle/>
-          <a:p>
-            <a:pPr>
-              <a:lnSpc>
-                <a:spcPct val="80000"/>
-              </a:lnSpc>
-              <a:spcBef>
-                <a:spcPct val="0"/>
-              </a:spcBef>
-              <a:buFontTx/>
-              <a:buNone/>
-            </a:pPr>
-            <a:r>
-              <a:rPr lang="en-US" sz="2800" dirty="0">
-                <a:latin typeface="Courier New" pitchFamily="49" charset="0"/>
-              </a:rPr>
-              <a:t>(</a:t>
-            </a:r>
-            <a:r>
-              <a:rPr lang="en-US" sz="2800" b="1" dirty="0">
-                <a:latin typeface="Courier New" pitchFamily="49" charset="0"/>
-              </a:rPr>
-              <a:t>lexical-address '(lambda (a b c)</a:t>
-            </a:r>
-          </a:p>
-          <a:p>
-            <a:pPr>
-              <a:lnSpc>
-                <a:spcPct val="80000"/>
-              </a:lnSpc>
-              <a:spcBef>
-                <a:spcPct val="0"/>
-              </a:spcBef>
-              <a:buFontTx/>
-              <a:buNone/>
-            </a:pPr>
-            <a:r>
-              <a:rPr lang="en-US" sz="2800" b="1" dirty="0">
-                <a:latin typeface="Courier New" pitchFamily="49" charset="0"/>
-              </a:rPr>
-              <a:t>                    (if (</a:t>
-            </a:r>
-            <a:r>
-              <a:rPr lang="en-US" sz="2800" b="1" dirty="0" err="1">
-                <a:latin typeface="Courier New" pitchFamily="49" charset="0"/>
-              </a:rPr>
-              <a:t>eq</a:t>
-            </a:r>
-            <a:r>
-              <a:rPr lang="en-US" sz="2800" b="1" dirty="0">
-                <a:latin typeface="Courier New" pitchFamily="49" charset="0"/>
-              </a:rPr>
-              <a:t>? b c)</a:t>
-            </a:r>
-          </a:p>
-          <a:p>
-            <a:pPr>
-              <a:lnSpc>
-                <a:spcPct val="80000"/>
-              </a:lnSpc>
-              <a:spcBef>
-                <a:spcPct val="0"/>
-              </a:spcBef>
-              <a:buFontTx/>
-              <a:buNone/>
-            </a:pPr>
-            <a:r>
-              <a:rPr lang="en-US" sz="2800" b="1" dirty="0">
-                <a:latin typeface="Courier New" pitchFamily="49" charset="0"/>
-              </a:rPr>
-              <a:t>                        ((lambda (c)</a:t>
-            </a:r>
-          </a:p>
-          <a:p>
-            <a:pPr>
-              <a:lnSpc>
-                <a:spcPct val="80000"/>
-              </a:lnSpc>
-              <a:spcBef>
-                <a:spcPct val="0"/>
-              </a:spcBef>
-              <a:buFontTx/>
-              <a:buNone/>
-            </a:pPr>
-            <a:r>
-              <a:rPr lang="en-US" sz="2800" b="1" dirty="0">
-                <a:latin typeface="Courier New" pitchFamily="49" charset="0"/>
-              </a:rPr>
-              <a:t>                           (cons a c))</a:t>
-            </a:r>
-          </a:p>
-          <a:p>
-            <a:pPr>
-              <a:lnSpc>
-                <a:spcPct val="80000"/>
-              </a:lnSpc>
-              <a:spcBef>
-                <a:spcPct val="0"/>
-              </a:spcBef>
-              <a:buFontTx/>
-              <a:buNone/>
-            </a:pPr>
-            <a:r>
-              <a:rPr lang="en-US" sz="2800" b="1" dirty="0">
-                <a:latin typeface="Courier New" pitchFamily="49" charset="0"/>
-              </a:rPr>
-              <a:t>                          a)</a:t>
-            </a:r>
-          </a:p>
-          <a:p>
-            <a:pPr>
-              <a:lnSpc>
-                <a:spcPct val="80000"/>
-              </a:lnSpc>
-              <a:spcBef>
-                <a:spcPct val="0"/>
-              </a:spcBef>
-              <a:buFontTx/>
-              <a:buNone/>
-            </a:pPr>
-            <a:r>
-              <a:rPr lang="en-US" sz="2800" b="1" dirty="0">
-                <a:latin typeface="Courier New" pitchFamily="49" charset="0"/>
-              </a:rPr>
-              <a:t>                        </a:t>
-            </a:r>
-            <a:r>
-              <a:rPr lang="en-US" sz="2800" b="1" dirty="0">
-                <a:latin typeface="+mj-lt"/>
-              </a:rPr>
-              <a:t> </a:t>
-            </a:r>
-            <a:r>
-              <a:rPr lang="en-US" sz="2800" b="1" dirty="0">
-                <a:latin typeface="Courier New" pitchFamily="49" charset="0"/>
-              </a:rPr>
-              <a:t>b)))    </a:t>
-            </a:r>
-            <a:r>
-              <a:rPr lang="en-US" sz="2800" b="1" dirty="0">
-                <a:solidFill>
-                  <a:srgbClr val="FFFF00"/>
-                </a:solidFill>
-                <a:latin typeface="Courier New" pitchFamily="49" charset="0"/>
-                <a:sym typeface="Wingdings" pitchFamily="2" charset="2"/>
-              </a:rPr>
-              <a:t></a:t>
-            </a:r>
-            <a:br>
-              <a:rPr lang="en-US" sz="2800" b="1" dirty="0">
-                <a:solidFill>
-                  <a:schemeClr val="bg2"/>
-                </a:solidFill>
-                <a:latin typeface="Courier New" pitchFamily="49" charset="0"/>
-                <a:sym typeface="Wingdings" pitchFamily="2" charset="2"/>
-              </a:rPr>
-            </a:br>
-            <a:endParaRPr lang="en-US" sz="2800" b="1" dirty="0">
-              <a:solidFill>
-                <a:schemeClr val="bg2"/>
-              </a:solidFill>
-              <a:latin typeface="Courier New" pitchFamily="49" charset="0"/>
-            </a:endParaRPr>
-          </a:p>
-          <a:p>
-            <a:pPr>
-              <a:lnSpc>
-                <a:spcPct val="80000"/>
-              </a:lnSpc>
-              <a:spcBef>
-                <a:spcPct val="0"/>
-              </a:spcBef>
-              <a:buFontTx/>
-              <a:buNone/>
-            </a:pPr>
-            <a:r>
-              <a:rPr lang="en-US" sz="2800" b="1" dirty="0">
-                <a:latin typeface="Courier New" pitchFamily="49" charset="0"/>
-              </a:rPr>
-              <a:t>(lambda (a b c)</a:t>
-            </a:r>
-          </a:p>
-          <a:p>
-            <a:pPr>
-              <a:lnSpc>
-                <a:spcPct val="80000"/>
-              </a:lnSpc>
-              <a:spcBef>
-                <a:spcPct val="0"/>
-              </a:spcBef>
-              <a:buFontTx/>
-              <a:buNone/>
-            </a:pPr>
-            <a:r>
-              <a:rPr lang="en-US" sz="2800" b="1" dirty="0">
-                <a:latin typeface="Courier New" pitchFamily="49" charset="0"/>
-              </a:rPr>
-              <a:t>  (if ((: free </a:t>
-            </a:r>
-            <a:r>
-              <a:rPr lang="en-US" sz="2800" b="1" dirty="0" err="1">
-                <a:latin typeface="Courier New" pitchFamily="49" charset="0"/>
-              </a:rPr>
-              <a:t>eq</a:t>
-            </a:r>
-            <a:r>
-              <a:rPr lang="en-US" sz="2800" b="1" dirty="0">
-                <a:latin typeface="Courier New" pitchFamily="49" charset="0"/>
-              </a:rPr>
-              <a:t>?) (: 0 1) (: 0 2))</a:t>
-            </a:r>
-          </a:p>
-          <a:p>
-            <a:pPr>
-              <a:lnSpc>
-                <a:spcPct val="80000"/>
-              </a:lnSpc>
-              <a:spcBef>
-                <a:spcPct val="0"/>
-              </a:spcBef>
-              <a:buFontTx/>
-              <a:buNone/>
-            </a:pPr>
-            <a:r>
-              <a:rPr lang="en-US" sz="2800" b="1" dirty="0">
-                <a:latin typeface="Courier New" pitchFamily="49" charset="0"/>
-              </a:rPr>
-              <a:t>      ((lambda (c) ((: free cons) </a:t>
-            </a:r>
-            <a:br>
-              <a:rPr lang="en-US" sz="2800" b="1" dirty="0">
-                <a:latin typeface="Courier New" pitchFamily="49" charset="0"/>
-              </a:rPr>
-            </a:br>
-            <a:r>
-              <a:rPr lang="en-US" sz="2800" b="1" dirty="0">
-                <a:latin typeface="Courier New" pitchFamily="49" charset="0"/>
-              </a:rPr>
-              <a:t>                  (: 1 0) </a:t>
-            </a:r>
-            <a:br>
-              <a:rPr lang="en-US" sz="2800" b="1" dirty="0">
-                <a:latin typeface="Courier New" pitchFamily="49" charset="0"/>
-              </a:rPr>
-            </a:br>
-            <a:r>
-              <a:rPr lang="en-US" sz="2800" b="1" dirty="0">
-                <a:latin typeface="Courier New" pitchFamily="49" charset="0"/>
-              </a:rPr>
-              <a:t>                  (: 0 0)))</a:t>
-            </a:r>
-          </a:p>
-          <a:p>
-            <a:pPr>
-              <a:lnSpc>
-                <a:spcPct val="80000"/>
-              </a:lnSpc>
-              <a:spcBef>
-                <a:spcPct val="0"/>
-              </a:spcBef>
-              <a:buFontTx/>
-              <a:buNone/>
-            </a:pPr>
-            <a:r>
-              <a:rPr lang="en-US" sz="2800" b="1" dirty="0">
-                <a:latin typeface="Courier New" pitchFamily="49" charset="0"/>
-              </a:rPr>
-              <a:t>       (: 0 0))</a:t>
-            </a:r>
-          </a:p>
-          <a:p>
-            <a:pPr>
-              <a:lnSpc>
-                <a:spcPct val="80000"/>
-              </a:lnSpc>
-              <a:spcBef>
-                <a:spcPct val="0"/>
-              </a:spcBef>
-              <a:buFontTx/>
-              <a:buNone/>
-            </a:pPr>
-            <a:r>
-              <a:rPr lang="en-US" sz="2800" b="1" dirty="0">
-                <a:latin typeface="Courier New" pitchFamily="49" charset="0"/>
-              </a:rPr>
-              <a:t>      (: 0 1)))</a:t>
-            </a:r>
-          </a:p>
-          <a:p>
-            <a:pPr>
-              <a:lnSpc>
-                <a:spcPct val="80000"/>
-              </a:lnSpc>
-              <a:buFontTx/>
-              <a:buNone/>
-            </a:pPr>
-            <a:endParaRPr lang="en-US" sz="2800" b="1" dirty="0">
-              <a:latin typeface="Courier New" pitchFamily="49" charset="0"/>
-            </a:endParaRPr>
-          </a:p>
-        </p:txBody>
-      </p:sp>
-      <p:sp>
-        <p:nvSpPr>
-          <p:cNvPr id="2" name="TextBox 1"/>
-          <p:cNvSpPr txBox="1"/>
-          <p:nvPr/>
-        </p:nvSpPr>
-        <p:spPr>
-          <a:xfrm>
-            <a:off x="609600" y="2286001"/>
-            <a:ext cx="5181601" cy="1200329"/>
-          </a:xfrm>
-          <a:prstGeom prst="rect">
-            <a:avLst/>
-          </a:prstGeom>
-          <a:noFill/>
-          <a:ln w="41275">
-            <a:solidFill>
-              <a:srgbClr val="FFFF00"/>
-            </a:solidFill>
-          </a:ln>
-        </p:spPr>
-        <p:txBody>
-          <a:bodyPr wrap="square" rtlCol="0">
-            <a:spAutoFit/>
-          </a:bodyPr>
-          <a:lstStyle/>
-          <a:p>
-            <a:r>
-              <a:rPr lang="en-US" dirty="0">
-                <a:solidFill>
-                  <a:srgbClr val="FFFF00"/>
-                </a:solidFill>
-              </a:rPr>
-              <a:t>You will write </a:t>
-            </a:r>
-            <a:r>
-              <a:rPr lang="en-US" b="1" dirty="0">
-                <a:solidFill>
-                  <a:srgbClr val="66CCFF"/>
-                </a:solidFill>
-                <a:latin typeface="Courier New" pitchFamily="49" charset="0"/>
-              </a:rPr>
-              <a:t>lexical-address</a:t>
-            </a:r>
-            <a:r>
-              <a:rPr lang="en-US" dirty="0">
-                <a:solidFill>
-                  <a:srgbClr val="FFFF00"/>
-                </a:solidFill>
-              </a:rPr>
-              <a:t> as part of A10. </a:t>
-            </a:r>
-            <a:br>
-              <a:rPr lang="en-US" dirty="0">
-                <a:solidFill>
-                  <a:srgbClr val="FFFF00"/>
-                </a:solidFill>
-              </a:rPr>
-            </a:br>
-            <a:r>
-              <a:rPr lang="en-US" dirty="0">
-                <a:solidFill>
-                  <a:srgbClr val="FFFF00"/>
-                </a:solidFill>
-              </a:rPr>
-              <a:t>Also </a:t>
-            </a:r>
-            <a:r>
-              <a:rPr lang="en-US" b="1" dirty="0">
-                <a:solidFill>
-                  <a:srgbClr val="66CCFF"/>
-                </a:solidFill>
-                <a:latin typeface="Courier New" panose="02070309020205020404" pitchFamily="49" charset="0"/>
-                <a:cs typeface="Courier New" panose="02070309020205020404" pitchFamily="49" charset="0"/>
-              </a:rPr>
-              <a:t>un-lexical-address</a:t>
-            </a:r>
-            <a:r>
-              <a:rPr lang="en-US" b="1" dirty="0">
-                <a:solidFill>
-                  <a:srgbClr val="FFFF00"/>
-                </a:solidFill>
-                <a:latin typeface="Courier New" pitchFamily="49" charset="0"/>
-              </a:rPr>
-              <a:t>.</a:t>
-            </a:r>
-            <a:endParaRPr lang="en-US" dirty="0">
-              <a:solidFill>
-                <a:srgbClr val="FFFF00"/>
-              </a:solidFill>
-            </a:endParaRPr>
-          </a:p>
-        </p:txBody>
-      </p:sp>
-    </p:spTree>
-    <p:extLst>
-      <p:ext uri="{BB962C8B-B14F-4D97-AF65-F5344CB8AC3E}">
-        <p14:creationId xmlns:p14="http://schemas.microsoft.com/office/powerpoint/2010/main" val="270141265"/>
-      </p:ext>
-    </p:extLst>
-  </p:cSld>
-  <p:clrMapOvr>
-    <a:masterClrMapping/>
-  </p:clrMapOvr>
-</p:sld>
-</file>
-
-<file path=ppt/slides/slide14.xml><?xml version="1.0" encoding="utf-8"?>
-<p:sld xmlns:a="http://schemas.openxmlformats.org/drawingml/2006/main" xmlns:r="http://schemas.openxmlformats.org/officeDocument/2006/relationships" xmlns:p="http://schemas.openxmlformats.org/presentationml/2006/main">
-  <p:cSld>
-    <p:spTree>
-      <p:nvGrpSpPr>
-        <p:cNvPr id="1" name=""/>
-        <p:cNvGrpSpPr/>
-        <p:nvPr/>
-      </p:nvGrpSpPr>
-      <p:grpSpPr>
-        <a:xfrm>
-          <a:off x="0" y="0"/>
-          <a:ext cx="0" cy="0"/>
-          <a:chOff x="0" y="0"/>
-          <a:chExt cx="0" cy="0"/>
-        </a:xfrm>
-      </p:grpSpPr>
-      <p:sp>
-        <p:nvSpPr>
-          <p:cNvPr id="539650" name="Rectangle 2"/>
-          <p:cNvSpPr>
-            <a:spLocks noGrp="1" noChangeArrowheads="1"/>
-          </p:cNvSpPr>
-          <p:nvPr>
-            <p:ph type="title"/>
-          </p:nvPr>
-        </p:nvSpPr>
-        <p:spPr>
-          <a:xfrm>
-            <a:off x="2133600" y="228600"/>
-            <a:ext cx="8229600" cy="762000"/>
-          </a:xfrm>
-        </p:spPr>
-        <p:txBody>
-          <a:bodyPr/>
-          <a:lstStyle/>
-          <a:p>
-            <a:r>
-              <a:rPr lang="en-US" dirty="0"/>
-              <a:t>lexical address exercises</a:t>
-            </a:r>
-          </a:p>
-        </p:txBody>
-      </p:sp>
-      <p:sp>
-        <p:nvSpPr>
-          <p:cNvPr id="539651" name="Rectangle 3"/>
-          <p:cNvSpPr>
-            <a:spLocks noGrp="1" noChangeArrowheads="1"/>
-          </p:cNvSpPr>
-          <p:nvPr>
-            <p:ph type="body" idx="1"/>
-          </p:nvPr>
-        </p:nvSpPr>
-        <p:spPr>
-          <a:xfrm>
-            <a:off x="4114800" y="953193"/>
-            <a:ext cx="8610600" cy="5486400"/>
-          </a:xfrm>
-        </p:spPr>
-        <p:txBody>
-          <a:bodyPr/>
-          <a:lstStyle/>
-          <a:p>
-            <a:pPr>
-              <a:lnSpc>
-                <a:spcPct val="80000"/>
-              </a:lnSpc>
-              <a:spcBef>
-                <a:spcPct val="0"/>
-              </a:spcBef>
-              <a:buFontTx/>
-              <a:buNone/>
-            </a:pPr>
-            <a:r>
-              <a:rPr lang="en-US" b="1" dirty="0">
-                <a:latin typeface="Courier New" pitchFamily="49" charset="0"/>
-              </a:rPr>
-              <a:t>(lexical-address</a:t>
-            </a:r>
-          </a:p>
-          <a:p>
-            <a:pPr>
-              <a:lnSpc>
-                <a:spcPct val="80000"/>
-              </a:lnSpc>
-              <a:spcBef>
-                <a:spcPct val="0"/>
-              </a:spcBef>
-              <a:buFontTx/>
-              <a:buNone/>
-            </a:pPr>
-            <a:r>
-              <a:rPr lang="en-US" b="1" dirty="0">
-                <a:latin typeface="Courier New" pitchFamily="49" charset="0"/>
-              </a:rPr>
-              <a:t> '</a:t>
-            </a:r>
-            <a:r>
-              <a:rPr lang="en-US" b="1" dirty="0">
-                <a:solidFill>
-                  <a:srgbClr val="FF66CC"/>
-                </a:solidFill>
-                <a:latin typeface="Courier New" pitchFamily="49" charset="0"/>
-              </a:rPr>
-              <a:t>(</a:t>
-            </a:r>
-            <a:r>
-              <a:rPr lang="en-US" b="1" dirty="0">
-                <a:solidFill>
-                  <a:srgbClr val="00B050"/>
-                </a:solidFill>
-                <a:latin typeface="Courier New" pitchFamily="49" charset="0"/>
-              </a:rPr>
-              <a:t>(</a:t>
-            </a:r>
-            <a:r>
-              <a:rPr lang="en-US" b="1" dirty="0">
-                <a:latin typeface="Courier New" pitchFamily="49" charset="0"/>
-              </a:rPr>
-              <a:t>lambda (x y)</a:t>
-            </a:r>
-          </a:p>
-          <a:p>
-            <a:pPr>
-              <a:lnSpc>
-                <a:spcPct val="80000"/>
-              </a:lnSpc>
-              <a:spcBef>
-                <a:spcPct val="0"/>
-              </a:spcBef>
-              <a:buFontTx/>
-              <a:buNone/>
-            </a:pPr>
-            <a:r>
-              <a:rPr lang="en-US" b="1" dirty="0">
-                <a:latin typeface="Courier New" pitchFamily="49" charset="0"/>
-              </a:rPr>
-              <a:t>     </a:t>
-            </a:r>
-            <a:r>
-              <a:rPr lang="en-US" b="1" dirty="0">
-                <a:solidFill>
-                  <a:srgbClr val="FF0000"/>
-                </a:solidFill>
-                <a:latin typeface="Courier New" pitchFamily="49" charset="0"/>
-              </a:rPr>
-              <a:t>(</a:t>
-            </a:r>
-            <a:r>
-              <a:rPr lang="en-US" b="1" dirty="0">
-                <a:solidFill>
-                  <a:srgbClr val="FFC000"/>
-                </a:solidFill>
-                <a:latin typeface="Courier New" pitchFamily="49" charset="0"/>
-              </a:rPr>
-              <a:t>(</a:t>
-            </a:r>
-            <a:r>
-              <a:rPr lang="en-US" b="1" dirty="0">
-                <a:solidFill>
-                  <a:srgbClr val="66CCFF"/>
-                </a:solidFill>
-                <a:latin typeface="Courier New" pitchFamily="49" charset="0"/>
-              </a:rPr>
-              <a:t>(</a:t>
-            </a:r>
-            <a:r>
-              <a:rPr lang="en-US" b="1" dirty="0">
-                <a:latin typeface="Courier New" pitchFamily="49" charset="0"/>
-              </a:rPr>
-              <a:t>lambda (z)</a:t>
-            </a:r>
-          </a:p>
-          <a:p>
-            <a:pPr>
-              <a:lnSpc>
-                <a:spcPct val="80000"/>
-              </a:lnSpc>
-              <a:spcBef>
-                <a:spcPct val="0"/>
-              </a:spcBef>
-              <a:buFontTx/>
-              <a:buNone/>
-            </a:pPr>
-            <a:r>
-              <a:rPr lang="en-US" b="1" dirty="0">
-                <a:latin typeface="Courier New" pitchFamily="49" charset="0"/>
-              </a:rPr>
-              <a:t>         </a:t>
-            </a:r>
-            <a:r>
-              <a:rPr lang="en-US" b="1" dirty="0">
-                <a:solidFill>
-                  <a:srgbClr val="7030A0"/>
-                </a:solidFill>
-                <a:latin typeface="Courier New" pitchFamily="49" charset="0"/>
-              </a:rPr>
-              <a:t>(</a:t>
-            </a:r>
-            <a:r>
-              <a:rPr lang="en-US" b="1" dirty="0">
-                <a:latin typeface="Courier New" pitchFamily="49" charset="0"/>
-              </a:rPr>
-              <a:t>lambda (w y)</a:t>
-            </a:r>
-          </a:p>
-          <a:p>
-            <a:pPr>
-              <a:lnSpc>
-                <a:spcPct val="80000"/>
-              </a:lnSpc>
-              <a:spcBef>
-                <a:spcPct val="0"/>
-              </a:spcBef>
-              <a:buFontTx/>
-              <a:buNone/>
-            </a:pPr>
-            <a:r>
-              <a:rPr lang="en-US" b="1" dirty="0">
-                <a:latin typeface="Courier New" pitchFamily="49" charset="0"/>
-              </a:rPr>
-              <a:t>           (+ x z w y)</a:t>
-            </a:r>
-            <a:r>
-              <a:rPr lang="en-US" b="1" dirty="0">
-                <a:solidFill>
-                  <a:srgbClr val="7030A0"/>
-                </a:solidFill>
-                <a:latin typeface="Courier New" pitchFamily="49" charset="0"/>
-              </a:rPr>
-              <a:t>)</a:t>
-            </a:r>
-            <a:r>
-              <a:rPr lang="en-US" b="1" dirty="0">
-                <a:solidFill>
-                  <a:srgbClr val="66CCFF"/>
-                </a:solidFill>
-                <a:latin typeface="Courier New" pitchFamily="49" charset="0"/>
-              </a:rPr>
-              <a:t>)</a:t>
-            </a:r>
-          </a:p>
-          <a:p>
-            <a:pPr>
-              <a:lnSpc>
-                <a:spcPct val="80000"/>
-              </a:lnSpc>
-              <a:spcBef>
-                <a:spcPct val="0"/>
-              </a:spcBef>
-              <a:buFontTx/>
-              <a:buNone/>
-            </a:pPr>
-            <a:r>
-              <a:rPr lang="en-US" b="1" dirty="0">
-                <a:latin typeface="Courier New" pitchFamily="49" charset="0"/>
-              </a:rPr>
-              <a:t>       (list w x y z)</a:t>
-            </a:r>
-            <a:r>
-              <a:rPr lang="en-US" b="1" dirty="0">
-                <a:solidFill>
-                  <a:srgbClr val="FFC000"/>
-                </a:solidFill>
-                <a:latin typeface="Courier New" pitchFamily="49" charset="0"/>
-              </a:rPr>
-              <a:t>)</a:t>
-            </a:r>
-          </a:p>
-          <a:p>
-            <a:pPr>
-              <a:lnSpc>
-                <a:spcPct val="80000"/>
-              </a:lnSpc>
-              <a:spcBef>
-                <a:spcPct val="0"/>
-              </a:spcBef>
-              <a:buFontTx/>
-              <a:buNone/>
-            </a:pPr>
-            <a:r>
-              <a:rPr lang="en-US" b="1" dirty="0">
-                <a:latin typeface="Courier New" pitchFamily="49" charset="0"/>
-              </a:rPr>
-              <a:t>      (+ x y z)</a:t>
-            </a:r>
-            <a:r>
-              <a:rPr lang="en-US" b="1" dirty="0">
-                <a:solidFill>
-                  <a:srgbClr val="FF0000"/>
-                </a:solidFill>
-                <a:latin typeface="Courier New" pitchFamily="49" charset="0"/>
-              </a:rPr>
-              <a:t>)</a:t>
-            </a:r>
-            <a:r>
-              <a:rPr lang="en-US" b="1" dirty="0">
-                <a:solidFill>
-                  <a:srgbClr val="00B050"/>
-                </a:solidFill>
-                <a:latin typeface="Courier New" pitchFamily="49" charset="0"/>
-              </a:rPr>
-              <a:t>)</a:t>
-            </a:r>
-          </a:p>
-          <a:p>
-            <a:pPr>
-              <a:lnSpc>
-                <a:spcPct val="80000"/>
-              </a:lnSpc>
-              <a:spcBef>
-                <a:spcPct val="0"/>
-              </a:spcBef>
-              <a:buFontTx/>
-              <a:buNone/>
-            </a:pPr>
-            <a:r>
-              <a:rPr lang="en-US" b="1" dirty="0">
-                <a:latin typeface="Courier New" pitchFamily="49" charset="0"/>
-              </a:rPr>
-              <a:t>   (y z)</a:t>
-            </a:r>
-            <a:r>
-              <a:rPr lang="en-US" b="1" dirty="0">
-                <a:solidFill>
-                  <a:srgbClr val="FF66CC"/>
-                </a:solidFill>
-                <a:latin typeface="Courier New" pitchFamily="49" charset="0"/>
-              </a:rPr>
-              <a:t>)</a:t>
-            </a:r>
-            <a:r>
-              <a:rPr lang="en-US" b="1" dirty="0">
-                <a:latin typeface="Courier New" pitchFamily="49" charset="0"/>
-              </a:rPr>
-              <a:t>)          </a:t>
-            </a:r>
-            <a:r>
-              <a:rPr lang="en-US" b="1" dirty="0">
-                <a:solidFill>
-                  <a:schemeClr val="bg2"/>
-                </a:solidFill>
-                <a:latin typeface="Courier New" pitchFamily="49" charset="0"/>
-              </a:rPr>
-              <a:t> </a:t>
-            </a:r>
-            <a:r>
-              <a:rPr lang="en-US" b="1" dirty="0">
-                <a:solidFill>
-                  <a:srgbClr val="FFFF00"/>
-                </a:solidFill>
-                <a:latin typeface="Courier New" pitchFamily="49" charset="0"/>
-                <a:sym typeface="Wingdings" pitchFamily="2" charset="2"/>
-              </a:rPr>
-              <a:t></a:t>
-            </a:r>
-            <a:endParaRPr lang="en-US" b="1" dirty="0">
-              <a:solidFill>
-                <a:srgbClr val="FFFF00"/>
-              </a:solidFill>
-              <a:latin typeface="Courier New" pitchFamily="49" charset="0"/>
-            </a:endParaRPr>
-          </a:p>
-          <a:p>
-            <a:pPr>
-              <a:lnSpc>
-                <a:spcPct val="80000"/>
-              </a:lnSpc>
-              <a:spcBef>
-                <a:spcPct val="0"/>
-              </a:spcBef>
-              <a:buFontTx/>
-              <a:buNone/>
-            </a:pPr>
-            <a:br>
-              <a:rPr lang="en-US" sz="2800" b="1" dirty="0">
-                <a:solidFill>
-                  <a:schemeClr val="bg2"/>
-                </a:solidFill>
-                <a:latin typeface="Courier New" pitchFamily="49" charset="0"/>
-              </a:rPr>
-            </a:br>
-            <a:endParaRPr lang="en-US" sz="2400" b="1" dirty="0">
-              <a:solidFill>
-                <a:srgbClr val="FFFF00"/>
-              </a:solidFill>
-              <a:latin typeface="Courier New" pitchFamily="49" charset="0"/>
-              <a:sym typeface="Wingdings" pitchFamily="2" charset="2"/>
-            </a:endParaRPr>
-          </a:p>
-          <a:p>
-            <a:pPr>
-              <a:lnSpc>
-                <a:spcPct val="80000"/>
-              </a:lnSpc>
-              <a:spcBef>
-                <a:spcPct val="0"/>
-              </a:spcBef>
-              <a:buFontTx/>
-              <a:buNone/>
-            </a:pPr>
-            <a:r>
-              <a:rPr lang="en-US" b="1" dirty="0">
-                <a:latin typeface="Courier New" pitchFamily="49" charset="0"/>
-              </a:rPr>
-              <a:t>(lexical-address</a:t>
-            </a:r>
-            <a:br>
-              <a:rPr lang="en-US" b="1" dirty="0">
-                <a:latin typeface="Courier New" pitchFamily="49" charset="0"/>
-              </a:rPr>
-            </a:br>
-            <a:r>
-              <a:rPr lang="en-US" b="1" dirty="0">
-                <a:latin typeface="Courier New" pitchFamily="49" charset="0"/>
-              </a:rPr>
-              <a:t>'(let ([a 3] [b 4])</a:t>
-            </a:r>
-          </a:p>
-          <a:p>
-            <a:pPr>
-              <a:lnSpc>
-                <a:spcPct val="80000"/>
-              </a:lnSpc>
-              <a:spcBef>
-                <a:spcPct val="0"/>
-              </a:spcBef>
-              <a:buFontTx/>
-              <a:buNone/>
-            </a:pPr>
-            <a:r>
-              <a:rPr lang="en-US" b="1" dirty="0">
-                <a:latin typeface="Courier New" pitchFamily="49" charset="0"/>
-              </a:rPr>
-              <a:t>    (let ([a (+ b 2)] [c a])</a:t>
-            </a:r>
-          </a:p>
-          <a:p>
-            <a:pPr>
-              <a:lnSpc>
-                <a:spcPct val="80000"/>
-              </a:lnSpc>
-              <a:spcBef>
-                <a:spcPct val="0"/>
-              </a:spcBef>
-              <a:buFontTx/>
-              <a:buNone/>
-            </a:pPr>
-            <a:r>
-              <a:rPr lang="en-US" b="1" dirty="0">
-                <a:latin typeface="Courier New" pitchFamily="49" charset="0"/>
-              </a:rPr>
-              <a:t>      (+ a b c))))</a:t>
-            </a:r>
-            <a:r>
-              <a:rPr lang="en-US" b="1" dirty="0">
-                <a:solidFill>
-                  <a:srgbClr val="FFFF00"/>
-                </a:solidFill>
-                <a:latin typeface="Courier New" pitchFamily="49" charset="0"/>
-                <a:sym typeface="Wingdings" pitchFamily="2" charset="2"/>
-              </a:rPr>
-              <a:t>      </a:t>
-            </a:r>
-            <a:endParaRPr lang="en-US" b="1" dirty="0">
-              <a:solidFill>
-                <a:srgbClr val="FFFF00"/>
-              </a:solidFill>
-              <a:latin typeface="Courier New" pitchFamily="49" charset="0"/>
-            </a:endParaRPr>
-          </a:p>
-          <a:p>
-            <a:pPr>
-              <a:lnSpc>
-                <a:spcPct val="80000"/>
-              </a:lnSpc>
-              <a:spcBef>
-                <a:spcPct val="0"/>
-              </a:spcBef>
-              <a:buFontTx/>
-              <a:buNone/>
-            </a:pPr>
-            <a:br>
-              <a:rPr lang="en-US" sz="2400" b="1" dirty="0">
-                <a:solidFill>
-                  <a:schemeClr val="bg2"/>
-                </a:solidFill>
-                <a:latin typeface="Courier New" pitchFamily="49" charset="0"/>
-              </a:rPr>
-            </a:br>
-            <a:endParaRPr lang="en-US" sz="2400" b="1" dirty="0">
-              <a:solidFill>
-                <a:schemeClr val="bg2"/>
-              </a:solidFill>
-              <a:latin typeface="Courier New" pitchFamily="49" charset="0"/>
-            </a:endParaRPr>
-          </a:p>
-          <a:p>
-            <a:pPr>
-              <a:lnSpc>
-                <a:spcPct val="80000"/>
-              </a:lnSpc>
-              <a:buFontTx/>
-              <a:buNone/>
-            </a:pPr>
-            <a:endParaRPr lang="en-US" sz="2000" b="1" dirty="0">
-              <a:latin typeface="Courier New" pitchFamily="49" charset="0"/>
-            </a:endParaRPr>
-          </a:p>
-        </p:txBody>
-      </p:sp>
-      <p:sp>
-        <p:nvSpPr>
-          <p:cNvPr id="2" name="TextBox 1">
-            <a:extLst>
-              <a:ext uri="{FF2B5EF4-FFF2-40B4-BE49-F238E27FC236}">
-                <a16:creationId xmlns:a16="http://schemas.microsoft.com/office/drawing/2014/main" id="{CC7D6DBD-C222-4A62-975D-CC1660416678}"/>
-              </a:ext>
-            </a:extLst>
-          </p:cNvPr>
-          <p:cNvSpPr txBox="1"/>
-          <p:nvPr/>
-        </p:nvSpPr>
-        <p:spPr>
-          <a:xfrm>
-            <a:off x="457200" y="1981200"/>
-            <a:ext cx="3200400" cy="646331"/>
-          </a:xfrm>
-          <a:prstGeom prst="rect">
-            <a:avLst/>
-          </a:prstGeom>
-          <a:noFill/>
-        </p:spPr>
-        <p:txBody>
-          <a:bodyPr wrap="square" rtlCol="0">
-            <a:spAutoFit/>
-          </a:bodyPr>
-          <a:lstStyle/>
-          <a:p>
-            <a:r>
-              <a:rPr lang="en-US" sz="3600" b="1" dirty="0">
-                <a:solidFill>
-                  <a:srgbClr val="EAEAEA"/>
-                </a:solidFill>
-                <a:latin typeface="Courier New" pitchFamily="49" charset="0"/>
-              </a:rPr>
-              <a:t>Exercise 1</a:t>
-            </a:r>
-          </a:p>
-        </p:txBody>
-      </p:sp>
-      <p:sp>
-        <p:nvSpPr>
-          <p:cNvPr id="5" name="TextBox 4">
-            <a:extLst>
-              <a:ext uri="{FF2B5EF4-FFF2-40B4-BE49-F238E27FC236}">
-                <a16:creationId xmlns:a16="http://schemas.microsoft.com/office/drawing/2014/main" id="{CCC52F88-70D7-4586-BBC2-DD5385CCAE14}"/>
-              </a:ext>
-            </a:extLst>
-          </p:cNvPr>
-          <p:cNvSpPr txBox="1"/>
-          <p:nvPr/>
-        </p:nvSpPr>
-        <p:spPr>
-          <a:xfrm>
-            <a:off x="457200" y="4876800"/>
-            <a:ext cx="3200400" cy="646331"/>
-          </a:xfrm>
-          <a:prstGeom prst="rect">
-            <a:avLst/>
-          </a:prstGeom>
-          <a:noFill/>
-        </p:spPr>
-        <p:txBody>
-          <a:bodyPr wrap="square" rtlCol="0">
-            <a:spAutoFit/>
-          </a:bodyPr>
-          <a:lstStyle/>
-          <a:p>
-            <a:r>
-              <a:rPr lang="en-US" sz="3600" b="1" dirty="0">
-                <a:solidFill>
-                  <a:srgbClr val="EAEAEA"/>
-                </a:solidFill>
-                <a:latin typeface="Courier New" pitchFamily="49" charset="0"/>
-              </a:rPr>
-              <a:t>Exercise 2</a:t>
-            </a:r>
-          </a:p>
-        </p:txBody>
-      </p:sp>
-    </p:spTree>
-    <p:extLst>
-      <p:ext uri="{BB962C8B-B14F-4D97-AF65-F5344CB8AC3E}">
-        <p14:creationId xmlns:p14="http://schemas.microsoft.com/office/powerpoint/2010/main" val="3647339432"/>
-      </p:ext>
-    </p:extLst>
-  </p:cSld>
-  <p:clrMapOvr>
-    <a:masterClrMapping/>
-  </p:clrMapOvr>
-</p:sld>
-</file>
-
-<file path=ppt/slides/slide15.xml><?xml version="1.0" encoding="utf-8"?>
-<p:sld xmlns:a="http://schemas.openxmlformats.org/drawingml/2006/main" xmlns:r="http://schemas.openxmlformats.org/officeDocument/2006/relationships" xmlns:p="http://schemas.openxmlformats.org/presentationml/2006/main">
-  <p:cSld>
-    <p:spTree>
-      <p:nvGrpSpPr>
-        <p:cNvPr id="1" name=""/>
-        <p:cNvGrpSpPr/>
-        <p:nvPr/>
-      </p:nvGrpSpPr>
-      <p:grpSpPr>
-        <a:xfrm>
-          <a:off x="0" y="0"/>
-          <a:ext cx="0" cy="0"/>
-          <a:chOff x="0" y="0"/>
-          <a:chExt cx="0" cy="0"/>
-        </a:xfrm>
-      </p:grpSpPr>
-      <p:sp>
-        <p:nvSpPr>
-          <p:cNvPr id="539650" name="Rectangle 2"/>
-          <p:cNvSpPr>
-            <a:spLocks noGrp="1" noChangeArrowheads="1"/>
-          </p:cNvSpPr>
-          <p:nvPr>
-            <p:ph type="title"/>
-          </p:nvPr>
-        </p:nvSpPr>
-        <p:spPr>
-          <a:xfrm>
-            <a:off x="3124200" y="304800"/>
-            <a:ext cx="7086600" cy="571500"/>
-          </a:xfrm>
-        </p:spPr>
-        <p:txBody>
-          <a:bodyPr/>
-          <a:lstStyle/>
-          <a:p>
-            <a:r>
-              <a:rPr lang="en-US" dirty="0"/>
-              <a:t>lexical address solution 1</a:t>
-            </a:r>
-          </a:p>
-        </p:txBody>
-      </p:sp>
-      <p:sp>
-        <p:nvSpPr>
-          <p:cNvPr id="539651" name="Rectangle 3"/>
-          <p:cNvSpPr>
-            <a:spLocks noGrp="1" noChangeArrowheads="1"/>
-          </p:cNvSpPr>
-          <p:nvPr>
-            <p:ph type="body" idx="1"/>
-          </p:nvPr>
-        </p:nvSpPr>
-        <p:spPr>
-          <a:xfrm>
-            <a:off x="152400" y="990600"/>
-            <a:ext cx="11811000" cy="4114800"/>
-          </a:xfrm>
-        </p:spPr>
-        <p:txBody>
-          <a:bodyPr/>
-          <a:lstStyle/>
-          <a:p>
-            <a:pPr>
-              <a:lnSpc>
-                <a:spcPct val="80000"/>
-              </a:lnSpc>
-              <a:spcBef>
-                <a:spcPct val="0"/>
-              </a:spcBef>
-              <a:buFontTx/>
-              <a:buNone/>
-            </a:pPr>
-            <a:r>
-              <a:rPr lang="en-US" sz="2500" b="1" dirty="0">
-                <a:latin typeface="Courier New" pitchFamily="49" charset="0"/>
-              </a:rPr>
-              <a:t>(lexical-address</a:t>
-            </a:r>
-          </a:p>
-          <a:p>
-            <a:pPr>
-              <a:lnSpc>
-                <a:spcPct val="80000"/>
-              </a:lnSpc>
-              <a:spcBef>
-                <a:spcPct val="0"/>
-              </a:spcBef>
-              <a:buFontTx/>
-              <a:buNone/>
-            </a:pPr>
-            <a:r>
-              <a:rPr lang="en-US" sz="2500" b="1" dirty="0">
-                <a:latin typeface="Courier New" pitchFamily="49" charset="0"/>
-              </a:rPr>
-              <a:t> '</a:t>
-            </a:r>
-            <a:r>
-              <a:rPr lang="en-US" sz="2500" b="1" dirty="0">
-                <a:solidFill>
-                  <a:srgbClr val="FF66CC"/>
-                </a:solidFill>
-                <a:latin typeface="Courier New" pitchFamily="49" charset="0"/>
-              </a:rPr>
-              <a:t>(</a:t>
-            </a:r>
-            <a:r>
-              <a:rPr lang="en-US" sz="2500" b="1" dirty="0">
-                <a:solidFill>
-                  <a:srgbClr val="00B050"/>
-                </a:solidFill>
-                <a:latin typeface="Courier New" pitchFamily="49" charset="0"/>
-              </a:rPr>
-              <a:t>(</a:t>
-            </a:r>
-            <a:r>
-              <a:rPr lang="en-US" sz="2500" b="1" dirty="0">
-                <a:latin typeface="Courier New" pitchFamily="49" charset="0"/>
-              </a:rPr>
-              <a:t>lambda (x y)</a:t>
-            </a:r>
-          </a:p>
-          <a:p>
-            <a:pPr>
-              <a:lnSpc>
-                <a:spcPct val="80000"/>
-              </a:lnSpc>
-              <a:spcBef>
-                <a:spcPct val="0"/>
-              </a:spcBef>
-              <a:buFontTx/>
-              <a:buNone/>
-            </a:pPr>
-            <a:r>
-              <a:rPr lang="en-US" sz="2500" b="1" dirty="0">
-                <a:latin typeface="Courier New" pitchFamily="49" charset="0"/>
-              </a:rPr>
-              <a:t>     </a:t>
-            </a:r>
-            <a:r>
-              <a:rPr lang="en-US" sz="2500" b="1" dirty="0">
-                <a:solidFill>
-                  <a:srgbClr val="FF0000"/>
-                </a:solidFill>
-                <a:latin typeface="Courier New" pitchFamily="49" charset="0"/>
-              </a:rPr>
-              <a:t>(</a:t>
-            </a:r>
-            <a:r>
-              <a:rPr lang="en-US" sz="2500" b="1" dirty="0">
-                <a:solidFill>
-                  <a:srgbClr val="FFC000"/>
-                </a:solidFill>
-                <a:latin typeface="Courier New" pitchFamily="49" charset="0"/>
-              </a:rPr>
-              <a:t>(</a:t>
-            </a:r>
-            <a:r>
-              <a:rPr lang="en-US" sz="2500" b="1" dirty="0">
-                <a:solidFill>
-                  <a:srgbClr val="66CCFF"/>
-                </a:solidFill>
-                <a:latin typeface="Courier New" pitchFamily="49" charset="0"/>
-              </a:rPr>
-              <a:t>(</a:t>
-            </a:r>
-            <a:r>
-              <a:rPr lang="en-US" sz="2500" b="1" dirty="0">
-                <a:latin typeface="Courier New" pitchFamily="49" charset="0"/>
-              </a:rPr>
-              <a:t>lambda (z)</a:t>
-            </a:r>
-          </a:p>
-          <a:p>
-            <a:pPr>
-              <a:lnSpc>
-                <a:spcPct val="80000"/>
-              </a:lnSpc>
-              <a:spcBef>
-                <a:spcPct val="0"/>
-              </a:spcBef>
-              <a:buFontTx/>
-              <a:buNone/>
-            </a:pPr>
-            <a:r>
-              <a:rPr lang="en-US" sz="2500" b="1" dirty="0">
-                <a:latin typeface="Courier New" pitchFamily="49" charset="0"/>
-              </a:rPr>
-              <a:t>         </a:t>
-            </a:r>
-            <a:r>
-              <a:rPr lang="en-US" sz="2500" b="1" dirty="0">
-                <a:solidFill>
-                  <a:srgbClr val="7030A0"/>
-                </a:solidFill>
-                <a:latin typeface="Courier New" pitchFamily="49" charset="0"/>
-              </a:rPr>
-              <a:t>(</a:t>
-            </a:r>
-            <a:r>
-              <a:rPr lang="en-US" sz="2500" b="1" dirty="0">
-                <a:latin typeface="Courier New" pitchFamily="49" charset="0"/>
-              </a:rPr>
-              <a:t>lambda (w y)</a:t>
-            </a:r>
-          </a:p>
-          <a:p>
-            <a:pPr>
-              <a:lnSpc>
-                <a:spcPct val="80000"/>
-              </a:lnSpc>
-              <a:spcBef>
-                <a:spcPct val="0"/>
-              </a:spcBef>
-              <a:buFontTx/>
-              <a:buNone/>
-            </a:pPr>
-            <a:r>
-              <a:rPr lang="en-US" sz="2500" b="1" dirty="0">
-                <a:latin typeface="Courier New" pitchFamily="49" charset="0"/>
-              </a:rPr>
-              <a:t>           (+ x z w y)</a:t>
-            </a:r>
-            <a:r>
-              <a:rPr lang="en-US" sz="2500" b="1" dirty="0">
-                <a:solidFill>
-                  <a:srgbClr val="7030A0"/>
-                </a:solidFill>
-                <a:latin typeface="Courier New" pitchFamily="49" charset="0"/>
-              </a:rPr>
-              <a:t>)</a:t>
-            </a:r>
-            <a:r>
-              <a:rPr lang="en-US" sz="2500" b="1" dirty="0">
-                <a:solidFill>
-                  <a:srgbClr val="66CCFF"/>
-                </a:solidFill>
-                <a:latin typeface="Courier New" pitchFamily="49" charset="0"/>
-              </a:rPr>
-              <a:t>)</a:t>
-            </a:r>
-          </a:p>
-          <a:p>
-            <a:pPr>
-              <a:lnSpc>
-                <a:spcPct val="80000"/>
-              </a:lnSpc>
-              <a:spcBef>
-                <a:spcPct val="0"/>
-              </a:spcBef>
-              <a:buFontTx/>
-              <a:buNone/>
-            </a:pPr>
-            <a:r>
-              <a:rPr lang="en-US" sz="2500" b="1" dirty="0">
-                <a:latin typeface="Courier New" pitchFamily="49" charset="0"/>
-              </a:rPr>
-              <a:t>       (list w x y z)</a:t>
-            </a:r>
-            <a:r>
-              <a:rPr lang="en-US" sz="2500" b="1" dirty="0">
-                <a:solidFill>
-                  <a:srgbClr val="FFC000"/>
-                </a:solidFill>
-                <a:latin typeface="Courier New" pitchFamily="49" charset="0"/>
-              </a:rPr>
-              <a:t>)</a:t>
-            </a:r>
-          </a:p>
-          <a:p>
-            <a:pPr>
-              <a:lnSpc>
-                <a:spcPct val="80000"/>
-              </a:lnSpc>
-              <a:spcBef>
-                <a:spcPct val="0"/>
-              </a:spcBef>
-              <a:buFontTx/>
-              <a:buNone/>
-            </a:pPr>
-            <a:r>
-              <a:rPr lang="en-US" sz="2500" b="1" dirty="0">
-                <a:latin typeface="Courier New" pitchFamily="49" charset="0"/>
-              </a:rPr>
-              <a:t>      (+ x y z)</a:t>
-            </a:r>
-            <a:r>
-              <a:rPr lang="en-US" sz="2500" b="1" dirty="0">
-                <a:solidFill>
-                  <a:srgbClr val="FF0000"/>
-                </a:solidFill>
-                <a:latin typeface="Courier New" pitchFamily="49" charset="0"/>
-              </a:rPr>
-              <a:t>)</a:t>
-            </a:r>
-            <a:r>
-              <a:rPr lang="en-US" sz="2500" b="1" dirty="0">
-                <a:solidFill>
-                  <a:srgbClr val="00B050"/>
-                </a:solidFill>
-                <a:latin typeface="Courier New" pitchFamily="49" charset="0"/>
-              </a:rPr>
-              <a:t>)</a:t>
-            </a:r>
-          </a:p>
-          <a:p>
-            <a:pPr>
-              <a:lnSpc>
-                <a:spcPct val="80000"/>
-              </a:lnSpc>
-              <a:spcBef>
-                <a:spcPct val="0"/>
-              </a:spcBef>
-              <a:buFontTx/>
-              <a:buNone/>
-            </a:pPr>
-            <a:r>
-              <a:rPr lang="en-US" sz="2500" b="1" dirty="0">
-                <a:latin typeface="Courier New" pitchFamily="49" charset="0"/>
-              </a:rPr>
-              <a:t>   (y z)</a:t>
-            </a:r>
-            <a:r>
-              <a:rPr lang="en-US" sz="2500" b="1" dirty="0">
-                <a:solidFill>
-                  <a:srgbClr val="FF66CC"/>
-                </a:solidFill>
-                <a:latin typeface="Courier New" pitchFamily="49" charset="0"/>
-              </a:rPr>
-              <a:t>)</a:t>
-            </a:r>
-            <a:r>
-              <a:rPr lang="en-US" sz="2500" b="1" dirty="0">
-                <a:latin typeface="Courier New" pitchFamily="49" charset="0"/>
-              </a:rPr>
-              <a:t>)          </a:t>
-            </a:r>
-            <a:r>
-              <a:rPr lang="en-US" sz="2500" b="1" dirty="0">
-                <a:solidFill>
-                  <a:schemeClr val="bg2"/>
-                </a:solidFill>
-                <a:latin typeface="Courier New" pitchFamily="49" charset="0"/>
-              </a:rPr>
-              <a:t> </a:t>
-            </a:r>
-            <a:r>
-              <a:rPr lang="en-US" sz="2500" b="1" dirty="0">
-                <a:solidFill>
-                  <a:srgbClr val="FFFF00"/>
-                </a:solidFill>
-                <a:latin typeface="Courier New" pitchFamily="49" charset="0"/>
-                <a:sym typeface="Wingdings" pitchFamily="2" charset="2"/>
-              </a:rPr>
-              <a:t></a:t>
-            </a:r>
-            <a:endParaRPr lang="en-US" sz="2500" b="1" dirty="0">
-              <a:solidFill>
-                <a:srgbClr val="FFFF00"/>
-              </a:solidFill>
-              <a:latin typeface="Courier New" pitchFamily="49" charset="0"/>
-            </a:endParaRPr>
-          </a:p>
-          <a:p>
-            <a:pPr>
-              <a:lnSpc>
-                <a:spcPct val="80000"/>
-              </a:lnSpc>
-              <a:spcBef>
-                <a:spcPct val="0"/>
-              </a:spcBef>
-              <a:buFontTx/>
-              <a:buNone/>
-            </a:pPr>
-            <a:br>
-              <a:rPr lang="en-US" sz="2500" b="1" dirty="0">
-                <a:solidFill>
-                  <a:schemeClr val="bg2"/>
-                </a:solidFill>
-                <a:latin typeface="Courier New" pitchFamily="49" charset="0"/>
-              </a:rPr>
-            </a:br>
-            <a:endParaRPr lang="en-US" sz="2500" b="1" dirty="0">
-              <a:solidFill>
-                <a:schemeClr val="bg2"/>
-              </a:solidFill>
-              <a:latin typeface="Courier New" pitchFamily="49" charset="0"/>
-            </a:endParaRPr>
-          </a:p>
-          <a:p>
-            <a:pPr>
-              <a:lnSpc>
-                <a:spcPct val="80000"/>
-              </a:lnSpc>
-              <a:spcBef>
-                <a:spcPct val="0"/>
-              </a:spcBef>
-              <a:buFontTx/>
-              <a:buNone/>
-            </a:pPr>
-            <a:r>
-              <a:rPr lang="en-US" sz="2500" b="1" dirty="0">
-                <a:solidFill>
-                  <a:srgbClr val="FF66CC"/>
-                </a:solidFill>
-                <a:latin typeface="Courier New" pitchFamily="49" charset="0"/>
-              </a:rPr>
-              <a:t>(</a:t>
-            </a:r>
-            <a:r>
-              <a:rPr lang="en-US" sz="2500" b="1" dirty="0">
-                <a:solidFill>
-                  <a:srgbClr val="00B050"/>
-                </a:solidFill>
-                <a:latin typeface="Courier New" pitchFamily="49" charset="0"/>
-              </a:rPr>
-              <a:t>(</a:t>
-            </a:r>
-            <a:r>
-              <a:rPr lang="en-US" sz="2500" b="1" dirty="0">
-                <a:latin typeface="Courier New" pitchFamily="49" charset="0"/>
-              </a:rPr>
-              <a:t>lambda (x y)</a:t>
-            </a:r>
-          </a:p>
-          <a:p>
-            <a:pPr>
-              <a:lnSpc>
-                <a:spcPct val="80000"/>
-              </a:lnSpc>
-              <a:spcBef>
-                <a:spcPct val="0"/>
-              </a:spcBef>
-              <a:buFontTx/>
-              <a:buNone/>
-            </a:pPr>
-            <a:r>
-              <a:rPr lang="en-US" sz="2500" b="1" dirty="0">
-                <a:latin typeface="Courier New" pitchFamily="49" charset="0"/>
-              </a:rPr>
-              <a:t>  </a:t>
-            </a:r>
-            <a:r>
-              <a:rPr lang="en-US" sz="2500" b="1" dirty="0">
-                <a:solidFill>
-                  <a:srgbClr val="FF0000"/>
-                </a:solidFill>
-                <a:latin typeface="Courier New" pitchFamily="49" charset="0"/>
-              </a:rPr>
-              <a:t>(</a:t>
-            </a:r>
-            <a:r>
-              <a:rPr lang="en-US" sz="2500" b="1" dirty="0">
-                <a:solidFill>
-                  <a:srgbClr val="FFC000"/>
-                </a:solidFill>
-                <a:latin typeface="Courier New" pitchFamily="49" charset="0"/>
-              </a:rPr>
-              <a:t>(</a:t>
-            </a:r>
-            <a:r>
-              <a:rPr lang="en-US" sz="2500" b="1" dirty="0">
-                <a:solidFill>
-                  <a:srgbClr val="66CCFF"/>
-                </a:solidFill>
-                <a:latin typeface="Courier New" pitchFamily="49" charset="0"/>
-              </a:rPr>
-              <a:t>(</a:t>
-            </a:r>
-            <a:r>
-              <a:rPr lang="en-US" sz="2500" b="1" dirty="0">
-                <a:latin typeface="Courier New" pitchFamily="49" charset="0"/>
-              </a:rPr>
-              <a:t>lambda (z)</a:t>
-            </a:r>
-          </a:p>
-          <a:p>
-            <a:pPr>
-              <a:lnSpc>
-                <a:spcPct val="80000"/>
-              </a:lnSpc>
-              <a:spcBef>
-                <a:spcPct val="0"/>
-              </a:spcBef>
-              <a:buFontTx/>
-              <a:buNone/>
-            </a:pPr>
-            <a:r>
-              <a:rPr lang="en-US" sz="2500" b="1" dirty="0">
-                <a:latin typeface="Courier New" pitchFamily="49" charset="0"/>
-              </a:rPr>
-              <a:t>     </a:t>
-            </a:r>
-            <a:r>
-              <a:rPr lang="en-US" sz="2500" b="1" dirty="0">
-                <a:solidFill>
-                  <a:srgbClr val="7030A0"/>
-                </a:solidFill>
-                <a:latin typeface="Courier New" pitchFamily="49" charset="0"/>
-              </a:rPr>
-              <a:t>(</a:t>
-            </a:r>
-            <a:r>
-              <a:rPr lang="en-US" sz="2500" b="1" dirty="0">
-                <a:latin typeface="Courier New" pitchFamily="49" charset="0"/>
-              </a:rPr>
-              <a:t>lambda (w y)</a:t>
-            </a:r>
-          </a:p>
-          <a:p>
-            <a:pPr>
-              <a:lnSpc>
-                <a:spcPct val="80000"/>
-              </a:lnSpc>
-              <a:spcBef>
-                <a:spcPct val="0"/>
-              </a:spcBef>
-              <a:buFontTx/>
-              <a:buNone/>
-            </a:pPr>
-            <a:r>
-              <a:rPr lang="en-US" sz="2500" b="1" dirty="0">
-                <a:latin typeface="Courier New" pitchFamily="49" charset="0"/>
-              </a:rPr>
-              <a:t>       ((: free +) (: 2 0) (: 1 0) (: 0 0) (: 0 1))</a:t>
-            </a:r>
-            <a:r>
-              <a:rPr lang="en-US" sz="2500" b="1" dirty="0">
-                <a:solidFill>
-                  <a:srgbClr val="7030A0"/>
-                </a:solidFill>
-                <a:latin typeface="Courier New" pitchFamily="49" charset="0"/>
-              </a:rPr>
-              <a:t>)</a:t>
-            </a:r>
-            <a:r>
-              <a:rPr lang="en-US" sz="2500" b="1" dirty="0">
-                <a:solidFill>
-                  <a:srgbClr val="66CCFF"/>
-                </a:solidFill>
-                <a:latin typeface="Courier New" pitchFamily="49" charset="0"/>
-              </a:rPr>
-              <a:t>)</a:t>
-            </a:r>
-          </a:p>
-          <a:p>
-            <a:pPr>
-              <a:lnSpc>
-                <a:spcPct val="80000"/>
-              </a:lnSpc>
-              <a:spcBef>
-                <a:spcPct val="0"/>
-              </a:spcBef>
-              <a:buFontTx/>
-              <a:buNone/>
-            </a:pPr>
-            <a:r>
-              <a:rPr lang="en-US" sz="2500" b="1" dirty="0">
-                <a:latin typeface="Courier New" pitchFamily="49" charset="0"/>
-              </a:rPr>
-              <a:t>   ((: free list) (: free w) (: 0 0) (: 0 1) (: free z))</a:t>
-            </a:r>
-            <a:r>
-              <a:rPr lang="en-US" sz="2500" b="1" dirty="0">
-                <a:solidFill>
-                  <a:srgbClr val="FFC000"/>
-                </a:solidFill>
-                <a:latin typeface="Courier New" pitchFamily="49" charset="0"/>
-              </a:rPr>
-              <a:t>)</a:t>
-            </a:r>
-          </a:p>
-          <a:p>
-            <a:pPr>
-              <a:lnSpc>
-                <a:spcPct val="80000"/>
-              </a:lnSpc>
-              <a:spcBef>
-                <a:spcPct val="0"/>
-              </a:spcBef>
-              <a:buFontTx/>
-              <a:buNone/>
-            </a:pPr>
-            <a:r>
-              <a:rPr lang="en-US" sz="2500" b="1" dirty="0">
-                <a:latin typeface="Courier New" pitchFamily="49" charset="0"/>
-              </a:rPr>
-              <a:t>    ((: free +) (: 0 0) (: 0 1) (: free z))</a:t>
-            </a:r>
-            <a:r>
-              <a:rPr lang="en-US" sz="2500" b="1" dirty="0">
-                <a:solidFill>
-                  <a:srgbClr val="FF0000"/>
-                </a:solidFill>
-                <a:latin typeface="Courier New" pitchFamily="49" charset="0"/>
-              </a:rPr>
-              <a:t>)</a:t>
-            </a:r>
-            <a:r>
-              <a:rPr lang="en-US" sz="2500" b="1" dirty="0">
-                <a:solidFill>
-                  <a:srgbClr val="00B050"/>
-                </a:solidFill>
-                <a:latin typeface="Courier New" pitchFamily="49" charset="0"/>
-              </a:rPr>
-              <a:t>)</a:t>
-            </a:r>
-          </a:p>
-          <a:p>
-            <a:pPr>
-              <a:lnSpc>
-                <a:spcPct val="80000"/>
-              </a:lnSpc>
-              <a:spcBef>
-                <a:spcPct val="0"/>
-              </a:spcBef>
-              <a:buFontTx/>
-              <a:buNone/>
-            </a:pPr>
-            <a:r>
-              <a:rPr lang="en-US" sz="2500" b="1" dirty="0">
-                <a:latin typeface="Courier New" pitchFamily="49" charset="0"/>
-              </a:rPr>
-              <a:t>  ((: free y) (: free z))</a:t>
-            </a:r>
-            <a:r>
-              <a:rPr lang="en-US" sz="2500" b="1" dirty="0">
-                <a:solidFill>
-                  <a:srgbClr val="FF66CC"/>
-                </a:solidFill>
-                <a:latin typeface="Courier New" pitchFamily="49" charset="0"/>
-              </a:rPr>
-              <a:t>)</a:t>
-            </a:r>
-            <a:endParaRPr lang="en-US" sz="2500" b="1" dirty="0">
-              <a:latin typeface="Courier New" pitchFamily="49" charset="0"/>
-            </a:endParaRPr>
-          </a:p>
-          <a:p>
-            <a:pPr>
-              <a:lnSpc>
-                <a:spcPct val="80000"/>
-              </a:lnSpc>
-              <a:buFontTx/>
-              <a:buNone/>
-            </a:pPr>
-            <a:endParaRPr lang="en-US" sz="2500" b="1" dirty="0">
-              <a:latin typeface="Courier New" pitchFamily="49" charset="0"/>
-            </a:endParaRPr>
-          </a:p>
-        </p:txBody>
-      </p:sp>
-    </p:spTree>
-    <p:extLst>
-      <p:ext uri="{BB962C8B-B14F-4D97-AF65-F5344CB8AC3E}">
-        <p14:creationId xmlns:p14="http://schemas.microsoft.com/office/powerpoint/2010/main" val="4106504420"/>
-      </p:ext>
-    </p:extLst>
-  </p:cSld>
-  <p:clrMapOvr>
-    <a:masterClrMapping/>
-  </p:clrMapOvr>
-</p:sld>
-</file>
-
-<file path=ppt/slides/slide16.xml><?xml version="1.0" encoding="utf-8"?>
-<p:sld xmlns:a="http://schemas.openxmlformats.org/drawingml/2006/main" xmlns:r="http://schemas.openxmlformats.org/officeDocument/2006/relationships" xmlns:p="http://schemas.openxmlformats.org/presentationml/2006/main">
-  <p:cSld>
-    <p:spTree>
-      <p:nvGrpSpPr>
-        <p:cNvPr id="1" name=""/>
-        <p:cNvGrpSpPr/>
-        <p:nvPr/>
-      </p:nvGrpSpPr>
-      <p:grpSpPr>
-        <a:xfrm>
-          <a:off x="0" y="0"/>
-          <a:ext cx="0" cy="0"/>
-          <a:chOff x="0" y="0"/>
-          <a:chExt cx="0" cy="0"/>
-        </a:xfrm>
-      </p:grpSpPr>
-      <p:sp>
-        <p:nvSpPr>
-          <p:cNvPr id="539650" name="Rectangle 2"/>
-          <p:cNvSpPr>
-            <a:spLocks noGrp="1" noChangeArrowheads="1"/>
-          </p:cNvSpPr>
-          <p:nvPr>
-            <p:ph type="title"/>
-          </p:nvPr>
-        </p:nvSpPr>
-        <p:spPr>
-          <a:xfrm>
-            <a:off x="2133600" y="76200"/>
-            <a:ext cx="8229600" cy="762000"/>
-          </a:xfrm>
-        </p:spPr>
-        <p:txBody>
-          <a:bodyPr/>
-          <a:lstStyle/>
-          <a:p>
-            <a:r>
-              <a:rPr lang="en-US" dirty="0"/>
-              <a:t>lexical address solution 2</a:t>
-            </a:r>
-          </a:p>
-        </p:txBody>
-      </p:sp>
-      <p:sp>
-        <p:nvSpPr>
-          <p:cNvPr id="539651" name="Rectangle 3"/>
-          <p:cNvSpPr>
-            <a:spLocks noGrp="1" noChangeArrowheads="1"/>
-          </p:cNvSpPr>
-          <p:nvPr>
-            <p:ph type="body" idx="1"/>
-          </p:nvPr>
-        </p:nvSpPr>
-        <p:spPr>
-          <a:xfrm>
-            <a:off x="685800" y="1066800"/>
-            <a:ext cx="10972800" cy="5486400"/>
-          </a:xfrm>
-        </p:spPr>
-        <p:txBody>
-          <a:bodyPr/>
-          <a:lstStyle/>
-          <a:p>
-            <a:pPr>
-              <a:lnSpc>
-                <a:spcPct val="80000"/>
-              </a:lnSpc>
-              <a:spcBef>
-                <a:spcPct val="0"/>
-              </a:spcBef>
-              <a:buFontTx/>
-              <a:buNone/>
-            </a:pPr>
-            <a:r>
-              <a:rPr lang="en-US" sz="3600" b="1" dirty="0">
-                <a:latin typeface="Courier New" pitchFamily="49" charset="0"/>
-              </a:rPr>
-              <a:t>(lexical-address</a:t>
-            </a:r>
-            <a:br>
-              <a:rPr lang="en-US" sz="3600" b="1" dirty="0">
-                <a:latin typeface="Courier New" pitchFamily="49" charset="0"/>
-              </a:rPr>
-            </a:br>
-            <a:r>
-              <a:rPr lang="en-US" sz="3600" b="1" dirty="0">
-                <a:latin typeface="Courier New" pitchFamily="49" charset="0"/>
-              </a:rPr>
-              <a:t>'(let ([a 3] [b 4])</a:t>
-            </a:r>
-          </a:p>
-          <a:p>
-            <a:pPr>
-              <a:lnSpc>
-                <a:spcPct val="80000"/>
-              </a:lnSpc>
-              <a:spcBef>
-                <a:spcPct val="0"/>
-              </a:spcBef>
-              <a:buFontTx/>
-              <a:buNone/>
-            </a:pPr>
-            <a:r>
-              <a:rPr lang="en-US" sz="3600" b="1" dirty="0">
-                <a:latin typeface="Courier New" pitchFamily="49" charset="0"/>
-              </a:rPr>
-              <a:t>    (let ([a (+ b 2)] [c a])</a:t>
-            </a:r>
-          </a:p>
-          <a:p>
-            <a:pPr>
-              <a:lnSpc>
-                <a:spcPct val="80000"/>
-              </a:lnSpc>
-              <a:spcBef>
-                <a:spcPct val="0"/>
-              </a:spcBef>
-              <a:buFontTx/>
-              <a:buNone/>
-            </a:pPr>
-            <a:r>
-              <a:rPr lang="en-US" sz="3600" b="1" dirty="0">
-                <a:latin typeface="Courier New" pitchFamily="49" charset="0"/>
-              </a:rPr>
-              <a:t>      (+ a b c))))</a:t>
-            </a:r>
-            <a:endParaRPr lang="en-US" sz="3600" b="1" dirty="0">
-              <a:solidFill>
-                <a:srgbClr val="FFFF00"/>
-              </a:solidFill>
-              <a:latin typeface="Courier New" pitchFamily="49" charset="0"/>
-              <a:sym typeface="Wingdings" pitchFamily="2" charset="2"/>
-            </a:endParaRPr>
-          </a:p>
-          <a:p>
-            <a:pPr>
-              <a:lnSpc>
-                <a:spcPct val="80000"/>
-              </a:lnSpc>
-              <a:spcBef>
-                <a:spcPct val="0"/>
-              </a:spcBef>
-              <a:buFontTx/>
-              <a:buNone/>
-            </a:pPr>
-            <a:r>
-              <a:rPr lang="en-US" b="1" dirty="0">
-                <a:solidFill>
-                  <a:srgbClr val="FFFF00"/>
-                </a:solidFill>
-                <a:latin typeface="Courier New" pitchFamily="49" charset="0"/>
-                <a:sym typeface="Wingdings" pitchFamily="2" charset="2"/>
-              </a:rPr>
-              <a:t>     </a:t>
-            </a:r>
-            <a:br>
-              <a:rPr lang="en-US" b="1" dirty="0">
-                <a:solidFill>
-                  <a:schemeClr val="bg2"/>
-                </a:solidFill>
-                <a:latin typeface="Courier New" pitchFamily="49" charset="0"/>
-              </a:rPr>
-            </a:br>
-            <a:endParaRPr lang="en-US" b="1" dirty="0">
-              <a:solidFill>
-                <a:schemeClr val="bg2"/>
-              </a:solidFill>
-              <a:latin typeface="Courier New" pitchFamily="49" charset="0"/>
-            </a:endParaRPr>
-          </a:p>
-          <a:p>
-            <a:pPr>
-              <a:lnSpc>
-                <a:spcPct val="80000"/>
-              </a:lnSpc>
-              <a:spcBef>
-                <a:spcPct val="0"/>
-              </a:spcBef>
-              <a:buFontTx/>
-              <a:buNone/>
-            </a:pPr>
-            <a:r>
-              <a:rPr lang="en-US" b="1" dirty="0">
-                <a:latin typeface="Courier New" pitchFamily="49" charset="0"/>
-              </a:rPr>
-              <a:t>(let ((a 3) (b 4))</a:t>
-            </a:r>
-          </a:p>
-          <a:p>
-            <a:pPr>
-              <a:lnSpc>
-                <a:spcPct val="80000"/>
-              </a:lnSpc>
-              <a:spcBef>
-                <a:spcPct val="0"/>
-              </a:spcBef>
-              <a:buFontTx/>
-              <a:buNone/>
-            </a:pPr>
-            <a:r>
-              <a:rPr lang="en-US" b="1" dirty="0">
-                <a:latin typeface="Courier New" pitchFamily="49" charset="0"/>
-              </a:rPr>
-              <a:t>  (let ((a ((: free +) (: 0 1) 2)) </a:t>
-            </a:r>
-          </a:p>
-          <a:p>
-            <a:pPr>
-              <a:lnSpc>
-                <a:spcPct val="80000"/>
-              </a:lnSpc>
-              <a:spcBef>
-                <a:spcPct val="0"/>
-              </a:spcBef>
-              <a:buFontTx/>
-              <a:buNone/>
-            </a:pPr>
-            <a:r>
-              <a:rPr lang="en-US" b="1" dirty="0">
-                <a:latin typeface="Courier New" pitchFamily="49" charset="0"/>
-              </a:rPr>
-              <a:t>        (c (: 0 0)))</a:t>
-            </a:r>
-          </a:p>
-          <a:p>
-            <a:pPr>
-              <a:lnSpc>
-                <a:spcPct val="80000"/>
-              </a:lnSpc>
-              <a:spcBef>
-                <a:spcPct val="0"/>
-              </a:spcBef>
-              <a:buFontTx/>
-              <a:buNone/>
-            </a:pPr>
-            <a:r>
-              <a:rPr lang="en-US" b="1" dirty="0">
-                <a:latin typeface="Courier New" pitchFamily="49" charset="0"/>
-              </a:rPr>
-              <a:t>    ((: free +) (: 0 0) (: 1 1) (: 0 1))))</a:t>
-            </a:r>
-          </a:p>
-        </p:txBody>
-      </p:sp>
-    </p:spTree>
-    <p:extLst>
-      <p:ext uri="{BB962C8B-B14F-4D97-AF65-F5344CB8AC3E}">
-        <p14:creationId xmlns:p14="http://schemas.microsoft.com/office/powerpoint/2010/main" val="1199001306"/>
+        <p14:creationId xmlns:p14="http://schemas.microsoft.com/office/powerpoint/2010/main" val="628968221"/>
       </p:ext>
     </p:extLst>
   </p:cSld>

</xml_diff>